<commit_message>
improvements to powerpoint and business overview
</commit_message>
<xml_diff>
--- a/fastapi-backend/app/pres/output.pptx
+++ b/fastapi-backend/app/pres/output.pptx
@@ -10,6 +10,7 @@
     <p:sldId id="258" r:id="rId8"/>
     <p:sldId id="259" r:id="rId9"/>
     <p:sldId id="260" r:id="rId10"/>
+    <p:sldId id="261" r:id="rId11"/>
   </p:sldIdLst>
   <p:sldSz cx="12192000" cy="6858000"/>
   <p:notesSz cx="6858000" cy="9144000"/>
@@ -3872,8 +3873,7 @@
           <a:lstStyle/>
           <a:p>
             <a:r>
-              <a:rPr lang="en-GB" dirty="0"/>
-              <a:t>Company Analysis</a:t>
+              <a:t>Amazon.com, Inc. Analysis</a:t>
             </a:r>
           </a:p>
         </p:txBody>
@@ -3938,7 +3938,7 @@
           <a:lstStyle/>
           <a:p>
             <a:r>
-              <a:t>Amazon's business overview has significantly evolved since its inception. Initially focused on online book sales, the company diversified into various product categories, e-commerce services, and technology offerings. In 1997, Amazon declared its ambition to provide a comprehensive online shopping experience, leveraging the nascent web environment to enhance selection and convenience. At that time, sales grew from $15.7 million in 1996 to $147.8 million in 1997. By 2022, Amazon's operations had expanded into three primary segments: North America, International, and Amazon Web Services (AWS). The primary revenue sources encompassed merchandise sales, third-party seller services, and digital content. In 2022, net sales in North America reached $315.88 billion, $118.01 billion internationally, and AWS contributed $80.09 billion. Amazon has forayed into grocery with Amazon Fresh and Whole Foods Market, an $800 billion market segment in the US. Amazon Business, launched in 2015, also recorded $35 billion in annualized gross sales by serving diverse organizational needs. Overall, Amazon's strategic expansion into new product lines and global markets has shaped it into a multifaceted tech and retail giant, reflecting its commitment to long-term growth and innovation.</a:t>
+              <a:t>Amazon's business overview has evolved significantly over the years. Initially, the primary revenue source was the sale of products through online stores. They recognized revenue from items sold from inventory and from third-party seller services. In recent years, Amazon expanded its customer offerings across large, unique market segments such as grocery and business procurement. The grocery segment includes investments in Whole Foods Markets and experimenting with Amazon Fresh. Amazon Business, launched in 2015, caters to the procurement needs of organizations and now drives roughly $35 billion in annual gross sales. Amazon has also diversified into various service offerings like web services through AWS, digital content subscriptions, advertising services, and enterprise services. AWS remains a vital segment, showing consistent growth from $62.2 billion in 2021 to $80.1 billion in 2022and $90.8 billion in 2023. Geographically, the company has shown robust growth, expanding its North American sales from $279.8 billion in 2021 to $352.8 billion in 2023, while international sales also fluctuated. These expansions are strategically focused on leveraging Amazon's infrastructure and logistics capabilities to meet diverse customer needs, ultimately aiming for sustainable long-term growth in free cash flow.</a:t>
             </a:r>
           </a:p>
         </p:txBody>
@@ -3977,7 +3977,7 @@
           <a:lstStyle/>
           <a:p>
             <a:r>
-              <a:t>overview figures</a:t>
+              <a:t>Cash Flow</a:t>
             </a:r>
           </a:p>
         </p:txBody>
@@ -3994,83 +3994,15 @@
         </p:nvSpPr>
         <p:spPr/>
         <p:txBody>
-          <a:bodyPr/>
+          <a:bodyPr wrap="square"/>
           <a:lstStyle/>
-          <a:p/>
-        </p:txBody>
-      </p:sp>
-      <p:pic>
-        <p:nvPicPr>
-          <p:cNvPr id="4" name="Picture 3" descr="overview_3.png"/>
-          <p:cNvPicPr>
-            <a:picLocks noChangeAspect="1"/>
-          </p:cNvPicPr>
-          <p:nvPr/>
-        </p:nvPicPr>
-        <p:blipFill>
-          <a:blip r:embed="rId2"/>
-          <a:stretch>
-            <a:fillRect/>
-          </a:stretch>
-        </p:blipFill>
-        <p:spPr>
-          <a:xfrm>
-            <a:off x="731520" y="1188720"/>
-            <a:ext cx="4572000" cy="2743200"/>
-          </a:xfrm>
-          <a:prstGeom prst="rect">
-            <a:avLst/>
-          </a:prstGeom>
-        </p:spPr>
-      </p:pic>
-      <p:pic>
-        <p:nvPicPr>
-          <p:cNvPr id="5" name="Picture 4" descr="overview_2.png"/>
-          <p:cNvPicPr>
-            <a:picLocks noChangeAspect="1"/>
-          </p:cNvPicPr>
-          <p:nvPr/>
-        </p:nvPicPr>
-        <p:blipFill>
-          <a:blip r:embed="rId3"/>
-          <a:stretch>
-            <a:fillRect/>
-          </a:stretch>
-        </p:blipFill>
-        <p:spPr>
-          <a:xfrm>
-            <a:off x="3931920" y="1188720"/>
-            <a:ext cx="4572000" cy="2743200"/>
-          </a:xfrm>
-          <a:prstGeom prst="rect">
-            <a:avLst/>
-          </a:prstGeom>
-        </p:spPr>
-      </p:pic>
-      <p:pic>
-        <p:nvPicPr>
-          <p:cNvPr id="6" name="Picture 5" descr="overview_1.png"/>
-          <p:cNvPicPr>
-            <a:picLocks noChangeAspect="1"/>
-          </p:cNvPicPr>
-          <p:nvPr/>
-        </p:nvPicPr>
-        <p:blipFill>
-          <a:blip r:embed="rId4"/>
-          <a:stretch>
-            <a:fillRect/>
-          </a:stretch>
-        </p:blipFill>
-        <p:spPr>
-          <a:xfrm>
-            <a:off x="731520" y="3931920"/>
-            <a:ext cx="4572000" cy="2743200"/>
-          </a:xfrm>
-          <a:prstGeom prst="rect">
-            <a:avLst/>
-          </a:prstGeom>
-        </p:spPr>
-      </p:pic>
+          <a:p>
+            <a:r>
+              <a:t>Amazon's cash flow has shown significant fluctuations over the past few years. In 2021, the net cash provided by operating activities was $46.33 billion, which slightly increased to $46.75 billion in 2022. However, in 2023 there was a substantial increase, with net cash provided by operating activities soaring to $84.95 billion. Investing activities saw a consistent outflow of cash, though the amounts varied. In 2021, the net cash used in investing activities was $58.15 billion, which decreased to $37.60 billion in 2022, followed by an increase to $49.83 billion in 2023. This variation is primarily attributed to fluctuations in property and equipment purchases and sales of marketable securities. Financing activities exhibited substantial changes. In 2021, financing activities provided $6.29 billion, which increased to $9.72 billion in 2022, but shifted to a significant outflow of $15.88 billion in 2023 as the company reduced its short-term and long-term debt. Overall, Amazon's net cash position showcased a dynamic evolution, reflecting its strategic investments and financial management practices aimed at supporting its expansive growth and infrastructure.</a:t>
+            </a:r>
+          </a:p>
+        </p:txBody>
+      </p:sp>
     </p:spTree>
   </p:cSld>
   <p:clrMapOvr>
@@ -4105,7 +4037,7 @@
           <a:lstStyle/>
           <a:p>
             <a:r>
-              <a:t>Cash Flow</a:t>
+              <a:t>cashflow figures</a:t>
             </a:r>
           </a:p>
         </p:txBody>
@@ -4122,15 +4054,83 @@
         </p:nvSpPr>
         <p:spPr/>
         <p:txBody>
-          <a:bodyPr wrap="square"/>
+          <a:bodyPr/>
           <a:lstStyle/>
-          <a:p>
-            <a:r>
-              <a:t>Over the past three years, Amazon's cash flow dynamics have evolved significantly. Net cash provided by operating activities was $66.1 billion in 2020 but decreased to $46.3 billion in 2021 and remained relatively flat at $46.8 billion in 2022. This decline is largely attributed to increased expenses, such as higher employee compensation and fulfillment costs. Investing cash flows have shown more variability. In 2020, net cash used in investing activities was $59.6 billion, which increased to $58.2 billion in 2021, but improved to $37.6 billion in 2022. This fluctuation is primarily due to heightened marketable securities purchases and increased capital expenditures for technology infrastructure and fulfillment capacity. Financing cash flows reflect substantial activity as well, with $9.7 billion provided in 2022, up from $6.3 billion in 2021 and an outflow of $1.1 billion in 2020. This rise is attributable to increased proceeds from short-term and long-term debt. Overall, Amazon has seen decreases in operational cash inflows and fluctuating investing outflows, balanced by an increase in financing activities reflecting strategic borrowing to support growth initiatives.</a:t>
-            </a:r>
-          </a:p>
-        </p:txBody>
-      </p:sp>
+          <a:p/>
+        </p:txBody>
+      </p:sp>
+      <p:pic>
+        <p:nvPicPr>
+          <p:cNvPr id="4" name="Picture 3" descr="cashflow_1.png"/>
+          <p:cNvPicPr>
+            <a:picLocks noChangeAspect="1"/>
+          </p:cNvPicPr>
+          <p:nvPr/>
+        </p:nvPicPr>
+        <p:blipFill>
+          <a:blip r:embed="rId2"/>
+          <a:stretch>
+            <a:fillRect/>
+          </a:stretch>
+        </p:blipFill>
+        <p:spPr>
+          <a:xfrm>
+            <a:off x="914400" y="1371600"/>
+            <a:ext cx="4572000" cy="2743200"/>
+          </a:xfrm>
+          <a:prstGeom prst="rect">
+            <a:avLst/>
+          </a:prstGeom>
+        </p:spPr>
+      </p:pic>
+      <p:pic>
+        <p:nvPicPr>
+          <p:cNvPr id="5" name="Picture 4" descr="cashflow_3.png"/>
+          <p:cNvPicPr>
+            <a:picLocks noChangeAspect="1"/>
+          </p:cNvPicPr>
+          <p:nvPr/>
+        </p:nvPicPr>
+        <p:blipFill>
+          <a:blip r:embed="rId3"/>
+          <a:stretch>
+            <a:fillRect/>
+          </a:stretch>
+        </p:blipFill>
+        <p:spPr>
+          <a:xfrm>
+            <a:off x="5486400" y="1371600"/>
+            <a:ext cx="4572000" cy="2743200"/>
+          </a:xfrm>
+          <a:prstGeom prst="rect">
+            <a:avLst/>
+          </a:prstGeom>
+        </p:spPr>
+      </p:pic>
+      <p:pic>
+        <p:nvPicPr>
+          <p:cNvPr id="6" name="Picture 5" descr="cashflow_2.png"/>
+          <p:cNvPicPr>
+            <a:picLocks noChangeAspect="1"/>
+          </p:cNvPicPr>
+          <p:nvPr/>
+        </p:nvPicPr>
+        <p:blipFill>
+          <a:blip r:embed="rId4"/>
+          <a:stretch>
+            <a:fillRect/>
+          </a:stretch>
+        </p:blipFill>
+        <p:spPr>
+          <a:xfrm>
+            <a:off x="914400" y="4114800"/>
+            <a:ext cx="4572000" cy="2743200"/>
+          </a:xfrm>
+          <a:prstGeom prst="rect">
+            <a:avLst/>
+          </a:prstGeom>
+        </p:spPr>
+      </p:pic>
     </p:spTree>
   </p:cSld>
   <p:clrMapOvr>
@@ -4165,7 +4165,67 @@
           <a:lstStyle/>
           <a:p>
             <a:r>
-              <a:t>cashflow figures</a:t>
+              <a:t>Net Interest Margin</a:t>
+            </a:r>
+          </a:p>
+        </p:txBody>
+      </p:sp>
+      <p:sp>
+        <p:nvSpPr>
+          <p:cNvPr id="3" name="Content Placeholder 2"/>
+          <p:cNvSpPr>
+            <a:spLocks noGrp="1"/>
+          </p:cNvSpPr>
+          <p:nvPr>
+            <p:ph idx="1"/>
+          </p:nvPr>
+        </p:nvSpPr>
+        <p:spPr/>
+        <p:txBody>
+          <a:bodyPr wrap="square"/>
+          <a:lstStyle/>
+          <a:p>
+            <a:r>
+              <a:t>The Net Interest Margin (NIM) of Amazon has varied over the recent years due to fluctuations in both interest income and interest expense.  In 2021, Amazon's interest income was $448 million with an interest expense of $1.8 billion. In 2022, the interest income increased to $989 million while interest expense rose to $2.4 billion. This trend continued in 2023, where interest income further rose significantly to $2.9 billion due to an increase in prevailing rates, while the interest expense increased to $3.2 billion primarily related to debt and finance leases. Overall, Amazon's interest income showed a significant increasing trend from 2021 to 2023, primarily due to rising prevailing rates and higher average balances of invested funds. Conversely, the company's interest expense also increased consistently over these years, mainly due to rising debt levels and finance leases costs. This impacted Amazon's NIM, reflecting the balancing act between rising income from investments and growing costs from debts. For detailed values and additional context, refer to the financial data and analysis from the provided reports.</a:t>
+            </a:r>
+          </a:p>
+        </p:txBody>
+      </p:sp>
+    </p:spTree>
+  </p:cSld>
+  <p:clrMapOvr>
+    <a:masterClrMapping/>
+  </p:clrMapOvr>
+</p:sld>
+</file>
+
+<file path=ppt/slides/slide6.xml><?xml version="1.0" encoding="utf-8"?>
+<p:sld xmlns:a="http://schemas.openxmlformats.org/drawingml/2006/main" xmlns:p="http://schemas.openxmlformats.org/presentationml/2006/main" xmlns:r="http://schemas.openxmlformats.org/officeDocument/2006/relationships">
+  <p:cSld>
+    <p:spTree>
+      <p:nvGrpSpPr>
+        <p:cNvPr id="1" name=""/>
+        <p:cNvGrpSpPr/>
+        <p:nvPr/>
+      </p:nvGrpSpPr>
+      <p:grpSpPr/>
+      <p:sp>
+        <p:nvSpPr>
+          <p:cNvPr id="2" name="Title 1"/>
+          <p:cNvSpPr>
+            <a:spLocks noGrp="1"/>
+          </p:cNvSpPr>
+          <p:nvPr>
+            <p:ph type="title"/>
+          </p:nvPr>
+        </p:nvSpPr>
+        <p:spPr/>
+        <p:txBody>
+          <a:bodyPr/>
+          <a:lstStyle/>
+          <a:p>
+            <a:r>
+              <a:t>netinterestmargin figures</a:t>
             </a:r>
           </a:p>
         </p:txBody>
@@ -4189,7 +4249,7 @@
       </p:sp>
       <p:pic>
         <p:nvPicPr>
-          <p:cNvPr id="4" name="Picture 3" descr="cashflow_1.png"/>
+          <p:cNvPr id="4" name="Picture 3" descr="netinterestmargin_2.png"/>
           <p:cNvPicPr>
             <a:picLocks noChangeAspect="1"/>
           </p:cNvPicPr>
@@ -4203,7 +4263,7 @@
         </p:blipFill>
         <p:spPr>
           <a:xfrm>
-            <a:off x="731520" y="1188720"/>
+            <a:off x="914400" y="1371600"/>
             <a:ext cx="4572000" cy="2743200"/>
           </a:xfrm>
           <a:prstGeom prst="rect">
@@ -4213,7 +4273,7 @@
       </p:pic>
       <p:pic>
         <p:nvPicPr>
-          <p:cNvPr id="5" name="Picture 4" descr="cashflow_3.png"/>
+          <p:cNvPr id="5" name="Picture 4" descr="netinterestmargin_3.png"/>
           <p:cNvPicPr>
             <a:picLocks noChangeAspect="1"/>
           </p:cNvPicPr>
@@ -4227,7 +4287,7 @@
         </p:blipFill>
         <p:spPr>
           <a:xfrm>
-            <a:off x="3931920" y="1188720"/>
+            <a:off x="5486400" y="1371600"/>
             <a:ext cx="4572000" cy="2743200"/>
           </a:xfrm>
           <a:prstGeom prst="rect">
@@ -4237,7 +4297,7 @@
       </p:pic>
       <p:pic>
         <p:nvPicPr>
-          <p:cNvPr id="6" name="Picture 5" descr="cashflow_2.png"/>
+          <p:cNvPr id="6" name="Picture 5" descr="netinterestmargin_1.png"/>
           <p:cNvPicPr>
             <a:picLocks noChangeAspect="1"/>
           </p:cNvPicPr>
@@ -4251,7 +4311,7 @@
         </p:blipFill>
         <p:spPr>
           <a:xfrm>
-            <a:off x="731520" y="3931920"/>
+            <a:off x="914400" y="4114800"/>
             <a:ext cx="4572000" cy="2743200"/>
           </a:xfrm>
           <a:prstGeom prst="rect">

</xml_diff>

<commit_message>
minor updates to docker
</commit_message>
<xml_diff>
--- a/fastapi-backend/app/pres/output.pptx
+++ b/fastapi-backend/app/pres/output.pptx
@@ -13,13 +13,6 @@
     <p:sldId id="261" r:id="rId11"/>
     <p:sldId id="262" r:id="rId12"/>
     <p:sldId id="263" r:id="rId13"/>
-    <p:sldId id="264" r:id="rId14"/>
-    <p:sldId id="265" r:id="rId15"/>
-    <p:sldId id="266" r:id="rId16"/>
-    <p:sldId id="267" r:id="rId17"/>
-    <p:sldId id="268" r:id="rId18"/>
-    <p:sldId id="269" r:id="rId19"/>
-    <p:sldId id="270" r:id="rId20"/>
   </p:sldIdLst>
   <p:sldSz cx="12192000" cy="6858000"/>
   <p:notesSz cx="6858000" cy="9144000"/>
@@ -3900,522 +3893,6 @@
 </p:sld>
 </file>
 
-<file path=ppt/slides/slide10.xml><?xml version="1.0" encoding="utf-8"?>
-<p:sld xmlns:a="http://schemas.openxmlformats.org/drawingml/2006/main" xmlns:p="http://schemas.openxmlformats.org/presentationml/2006/main" xmlns:r="http://schemas.openxmlformats.org/officeDocument/2006/relationships">
-  <p:cSld>
-    <p:spTree>
-      <p:nvGrpSpPr>
-        <p:cNvPr id="1" name=""/>
-        <p:cNvGrpSpPr/>
-        <p:nvPr/>
-      </p:nvGrpSpPr>
-      <p:grpSpPr/>
-      <p:sp>
-        <p:nvSpPr>
-          <p:cNvPr id="2" name="Title 1"/>
-          <p:cNvSpPr>
-            <a:spLocks noGrp="1"/>
-          </p:cNvSpPr>
-          <p:nvPr>
-            <p:ph type="title"/>
-          </p:nvPr>
-        </p:nvSpPr>
-        <p:spPr/>
-        <p:txBody>
-          <a:bodyPr/>
-          <a:lstStyle/>
-          <a:p>
-            <a:r>
-              <a:t>Revenue</a:t>
-            </a:r>
-          </a:p>
-        </p:txBody>
-      </p:sp>
-      <p:sp>
-        <p:nvSpPr>
-          <p:cNvPr id="3" name="Content Placeholder 2"/>
-          <p:cNvSpPr>
-            <a:spLocks noGrp="1"/>
-          </p:cNvSpPr>
-          <p:nvPr>
-            <p:ph idx="1"/>
-          </p:nvPr>
-        </p:nvSpPr>
-        <p:spPr/>
-        <p:txBody>
-          <a:bodyPr wrap="square"/>
-          <a:lstStyle/>
-          <a:p>
-            <a:r>
-              <a:t>Amazon's revenue showcased robust growth from 2020 to 2022, albeit with varying dynamics across different segments and regions. The total net sales increased from $386.1 billion in 2020 to $513.98 billion in 2022, representing an annual growth rate of 16.2%. In terms of segments, North America experienced consistent growth with revenues increasing from $236.3 billion in 2020 to $315.9 billion in 2022. Contrarily, the International segment saw fluctuations, growing from $104.4 billion in 2020 to $127.8 billion in 2021, before declining to $118.0 billion in 2022, influenced by currency fluctuations. AWS stood out as a significant growth driver, with revenues rising from $45.4 billion in 2020 to $80.1 billion in 2022, marking an 76.4% increase over the period. Notably, the growth in AWS revenue was driven by increased customer usage and long-term customer contracts.</a:t>
-            </a:r>
-          </a:p>
-        </p:txBody>
-      </p:sp>
-    </p:spTree>
-  </p:cSld>
-  <p:clrMapOvr>
-    <a:masterClrMapping/>
-  </p:clrMapOvr>
-</p:sld>
-</file>
-
-<file path=ppt/slides/slide11.xml><?xml version="1.0" encoding="utf-8"?>
-<p:sld xmlns:a="http://schemas.openxmlformats.org/drawingml/2006/main" xmlns:p="http://schemas.openxmlformats.org/presentationml/2006/main" xmlns:r="http://schemas.openxmlformats.org/officeDocument/2006/relationships">
-  <p:cSld>
-    <p:spTree>
-      <p:nvGrpSpPr>
-        <p:cNvPr id="1" name=""/>
-        <p:cNvGrpSpPr/>
-        <p:nvPr/>
-      </p:nvGrpSpPr>
-      <p:grpSpPr/>
-      <p:sp>
-        <p:nvSpPr>
-          <p:cNvPr id="2" name="Title 1"/>
-          <p:cNvSpPr>
-            <a:spLocks noGrp="1"/>
-          </p:cNvSpPr>
-          <p:nvPr>
-            <p:ph type="title"/>
-          </p:nvPr>
-        </p:nvSpPr>
-        <p:spPr/>
-        <p:txBody>
-          <a:bodyPr/>
-          <a:lstStyle/>
-          <a:p>
-            <a:r>
-              <a:t>revenue figures</a:t>
-            </a:r>
-          </a:p>
-        </p:txBody>
-      </p:sp>
-      <p:sp>
-        <p:nvSpPr>
-          <p:cNvPr id="3" name="Content Placeholder 2"/>
-          <p:cNvSpPr>
-            <a:spLocks noGrp="1"/>
-          </p:cNvSpPr>
-          <p:nvPr>
-            <p:ph idx="1"/>
-          </p:nvPr>
-        </p:nvSpPr>
-        <p:spPr/>
-        <p:txBody>
-          <a:bodyPr/>
-          <a:lstStyle/>
-          <a:p/>
-        </p:txBody>
-      </p:sp>
-      <p:pic>
-        <p:nvPicPr>
-          <p:cNvPr id="4" name="Picture 3" descr="revenue_1.png"/>
-          <p:cNvPicPr>
-            <a:picLocks noChangeAspect="1"/>
-          </p:cNvPicPr>
-          <p:nvPr/>
-        </p:nvPicPr>
-        <p:blipFill>
-          <a:blip r:embed="rId2"/>
-          <a:stretch>
-            <a:fillRect/>
-          </a:stretch>
-        </p:blipFill>
-        <p:spPr>
-          <a:xfrm>
-            <a:off x="914400" y="1371600"/>
-            <a:ext cx="4572000" cy="2743200"/>
-          </a:xfrm>
-          <a:prstGeom prst="rect">
-            <a:avLst/>
-          </a:prstGeom>
-        </p:spPr>
-      </p:pic>
-    </p:spTree>
-  </p:cSld>
-  <p:clrMapOvr>
-    <a:masterClrMapping/>
-  </p:clrMapOvr>
-</p:sld>
-</file>
-
-<file path=ppt/slides/slide12.xml><?xml version="1.0" encoding="utf-8"?>
-<p:sld xmlns:a="http://schemas.openxmlformats.org/drawingml/2006/main" xmlns:p="http://schemas.openxmlformats.org/presentationml/2006/main" xmlns:r="http://schemas.openxmlformats.org/officeDocument/2006/relationships">
-  <p:cSld>
-    <p:spTree>
-      <p:nvGrpSpPr>
-        <p:cNvPr id="1" name=""/>
-        <p:cNvGrpSpPr/>
-        <p:nvPr/>
-      </p:nvGrpSpPr>
-      <p:grpSpPr/>
-      <p:sp>
-        <p:nvSpPr>
-          <p:cNvPr id="2" name="Title 1"/>
-          <p:cNvSpPr>
-            <a:spLocks noGrp="1"/>
-          </p:cNvSpPr>
-          <p:nvPr>
-            <p:ph type="title"/>
-          </p:nvPr>
-        </p:nvSpPr>
-        <p:spPr/>
-        <p:txBody>
-          <a:bodyPr/>
-          <a:lstStyle/>
-          <a:p>
-            <a:r>
-              <a:t>Operating Income</a:t>
-            </a:r>
-          </a:p>
-        </p:txBody>
-      </p:sp>
-      <p:sp>
-        <p:nvSpPr>
-          <p:cNvPr id="3" name="Content Placeholder 2"/>
-          <p:cNvSpPr>
-            <a:spLocks noGrp="1"/>
-          </p:cNvSpPr>
-          <p:nvPr>
-            <p:ph idx="1"/>
-          </p:nvPr>
-        </p:nvSpPr>
-        <p:spPr/>
-        <p:txBody>
-          <a:bodyPr wrap="square"/>
-          <a:lstStyle/>
-          <a:p>
-            <a:r>
-              <a:t>The operating income of Amazon.com, Inc. has significantly varied across different time frames and business segments. In 2020, the total operating income was $22.9 billion, which increased to $24.9 billion in 2021 but dropped sharply to $12.2 billion in 2022. Looking at individual segments, the North America segment reported an operating income of $8.7 billion in 2020. This number decreased to $7.3 billion in 2021 and then plummeted to a loss of $2.8 billion in 2022. The International segment experienced a modest operating income of $0.7 billion in 2020, which turned into a loss of $0.9 billion in 2021 and worsened to a loss of $7.7 billion in 2022. The AWS segment remained more stable and showed continuous growth with operating incomes of $13.5 billion in 2020, $18.5 billion in 2021, and $22.8 billion in 2022. The decline in operating income in 2022 primarily resulted from increased fulfillment and shipping costs, investments in the fulfillment network, wage rate increases, and higher technology and content costs. The AWS segment's improved performance, however, was mainly driven by increased sales and cost structure productivity.  These financial dynamics highlight the fluctuating nature of Amazon's profitability across different segments and years.</a:t>
-            </a:r>
-          </a:p>
-        </p:txBody>
-      </p:sp>
-    </p:spTree>
-  </p:cSld>
-  <p:clrMapOvr>
-    <a:masterClrMapping/>
-  </p:clrMapOvr>
-</p:sld>
-</file>
-
-<file path=ppt/slides/slide13.xml><?xml version="1.0" encoding="utf-8"?>
-<p:sld xmlns:a="http://schemas.openxmlformats.org/drawingml/2006/main" xmlns:p="http://schemas.openxmlformats.org/presentationml/2006/main" xmlns:r="http://schemas.openxmlformats.org/officeDocument/2006/relationships">
-  <p:cSld>
-    <p:spTree>
-      <p:nvGrpSpPr>
-        <p:cNvPr id="1" name=""/>
-        <p:cNvGrpSpPr/>
-        <p:nvPr/>
-      </p:nvGrpSpPr>
-      <p:grpSpPr/>
-      <p:sp>
-        <p:nvSpPr>
-          <p:cNvPr id="2" name="Title 1"/>
-          <p:cNvSpPr>
-            <a:spLocks noGrp="1"/>
-          </p:cNvSpPr>
-          <p:nvPr>
-            <p:ph type="title"/>
-          </p:nvPr>
-        </p:nvSpPr>
-        <p:spPr/>
-        <p:txBody>
-          <a:bodyPr/>
-          <a:lstStyle/>
-          <a:p>
-            <a:r>
-              <a:t>operatingincome figures</a:t>
-            </a:r>
-          </a:p>
-        </p:txBody>
-      </p:sp>
-      <p:sp>
-        <p:nvSpPr>
-          <p:cNvPr id="3" name="Content Placeholder 2"/>
-          <p:cNvSpPr>
-            <a:spLocks noGrp="1"/>
-          </p:cNvSpPr>
-          <p:nvPr>
-            <p:ph idx="1"/>
-          </p:nvPr>
-        </p:nvSpPr>
-        <p:spPr/>
-        <p:txBody>
-          <a:bodyPr/>
-          <a:lstStyle/>
-          <a:p/>
-        </p:txBody>
-      </p:sp>
-      <p:pic>
-        <p:nvPicPr>
-          <p:cNvPr id="4" name="Picture 3" descr="operatingincome_3.png"/>
-          <p:cNvPicPr>
-            <a:picLocks noChangeAspect="1"/>
-          </p:cNvPicPr>
-          <p:nvPr/>
-        </p:nvPicPr>
-        <p:blipFill>
-          <a:blip r:embed="rId2"/>
-          <a:stretch>
-            <a:fillRect/>
-          </a:stretch>
-        </p:blipFill>
-        <p:spPr>
-          <a:xfrm>
-            <a:off x="914400" y="1371600"/>
-            <a:ext cx="4572000" cy="2743200"/>
-          </a:xfrm>
-          <a:prstGeom prst="rect">
-            <a:avLst/>
-          </a:prstGeom>
-        </p:spPr>
-      </p:pic>
-      <p:pic>
-        <p:nvPicPr>
-          <p:cNvPr id="5" name="Picture 4" descr="operatingincome_2.png"/>
-          <p:cNvPicPr>
-            <a:picLocks noChangeAspect="1"/>
-          </p:cNvPicPr>
-          <p:nvPr/>
-        </p:nvPicPr>
-        <p:blipFill>
-          <a:blip r:embed="rId3"/>
-          <a:stretch>
-            <a:fillRect/>
-          </a:stretch>
-        </p:blipFill>
-        <p:spPr>
-          <a:xfrm>
-            <a:off x="5943600" y="1371600"/>
-            <a:ext cx="4572000" cy="2743200"/>
-          </a:xfrm>
-          <a:prstGeom prst="rect">
-            <a:avLst/>
-          </a:prstGeom>
-        </p:spPr>
-      </p:pic>
-      <p:pic>
-        <p:nvPicPr>
-          <p:cNvPr id="6" name="Picture 5" descr="operatingincome_1.png"/>
-          <p:cNvPicPr>
-            <a:picLocks noChangeAspect="1"/>
-          </p:cNvPicPr>
-          <p:nvPr/>
-        </p:nvPicPr>
-        <p:blipFill>
-          <a:blip r:embed="rId4"/>
-          <a:stretch>
-            <a:fillRect/>
-          </a:stretch>
-        </p:blipFill>
-        <p:spPr>
-          <a:xfrm>
-            <a:off x="914400" y="4114800"/>
-            <a:ext cx="4572000" cy="2743200"/>
-          </a:xfrm>
-          <a:prstGeom prst="rect">
-            <a:avLst/>
-          </a:prstGeom>
-        </p:spPr>
-      </p:pic>
-    </p:spTree>
-  </p:cSld>
-  <p:clrMapOvr>
-    <a:masterClrMapping/>
-  </p:clrMapOvr>
-</p:sld>
-</file>
-
-<file path=ppt/slides/slide14.xml><?xml version="1.0" encoding="utf-8"?>
-<p:sld xmlns:a="http://schemas.openxmlformats.org/drawingml/2006/main" xmlns:p="http://schemas.openxmlformats.org/presentationml/2006/main" xmlns:r="http://schemas.openxmlformats.org/officeDocument/2006/relationships">
-  <p:cSld>
-    <p:spTree>
-      <p:nvGrpSpPr>
-        <p:cNvPr id="1" name=""/>
-        <p:cNvGrpSpPr/>
-        <p:nvPr/>
-      </p:nvGrpSpPr>
-      <p:grpSpPr/>
-      <p:sp>
-        <p:nvSpPr>
-          <p:cNvPr id="2" name="Title 1"/>
-          <p:cNvSpPr>
-            <a:spLocks noGrp="1"/>
-          </p:cNvSpPr>
-          <p:nvPr>
-            <p:ph type="title"/>
-          </p:nvPr>
-        </p:nvSpPr>
-        <p:spPr/>
-        <p:txBody>
-          <a:bodyPr/>
-          <a:lstStyle/>
-          <a:p>
-            <a:r>
-              <a:t>Cash Flow</a:t>
-            </a:r>
-          </a:p>
-        </p:txBody>
-      </p:sp>
-      <p:sp>
-        <p:nvSpPr>
-          <p:cNvPr id="3" name="Content Placeholder 2"/>
-          <p:cNvSpPr>
-            <a:spLocks noGrp="1"/>
-          </p:cNvSpPr>
-          <p:nvPr>
-            <p:ph idx="1"/>
-          </p:nvPr>
-        </p:nvSpPr>
-        <p:spPr/>
-        <p:txBody>
-          <a:bodyPr wrap="square"/>
-          <a:lstStyle/>
-          <a:p>
-            <a:r>
-              <a:t>Amazon's cash flow has shown significant changes over the analyzed years. Operating Activities: - 2020: \$66.1 billion - 2021: \$46.3 billion - 2022: \$46.8 billion The decline from 2020 to 2021 ($19.8 billion) and stability from 2021 to 2022 indicate fluctuations in net income and working capital changes. Investing Activities: - 2020: \$59.6 billion used - 2021: \$58.2 billion used - 2022: \$37.6 billion used Significant investments primarily in technology infrastructure and fulfillment networks. Financing Activities: - 2020: \$1.1 billion used - 2021: \$6.3 billion provided - 2022: \$9.7 billion provided Increased financing activities mainly due to debt proceeds. Free Cash Flow: - 2021: \$9.1 billion used - 2022: \$11.6 billion used The downward trend in free cash flow results from increasing property and equipment expenditures. Overall, Amazon's strategy focuses on long-term growth through heavy investments, while maintaining substantial operating cash flow reflects a balanced approach to supporting expansive business initiatives.</a:t>
-            </a:r>
-          </a:p>
-        </p:txBody>
-      </p:sp>
-    </p:spTree>
-  </p:cSld>
-  <p:clrMapOvr>
-    <a:masterClrMapping/>
-  </p:clrMapOvr>
-</p:sld>
-</file>
-
-<file path=ppt/slides/slide15.xml><?xml version="1.0" encoding="utf-8"?>
-<p:sld xmlns:a="http://schemas.openxmlformats.org/drawingml/2006/main" xmlns:p="http://schemas.openxmlformats.org/presentationml/2006/main" xmlns:r="http://schemas.openxmlformats.org/officeDocument/2006/relationships">
-  <p:cSld>
-    <p:spTree>
-      <p:nvGrpSpPr>
-        <p:cNvPr id="1" name=""/>
-        <p:cNvGrpSpPr/>
-        <p:nvPr/>
-      </p:nvGrpSpPr>
-      <p:grpSpPr/>
-      <p:sp>
-        <p:nvSpPr>
-          <p:cNvPr id="2" name="Title 1"/>
-          <p:cNvSpPr>
-            <a:spLocks noGrp="1"/>
-          </p:cNvSpPr>
-          <p:nvPr>
-            <p:ph type="title"/>
-          </p:nvPr>
-        </p:nvSpPr>
-        <p:spPr/>
-        <p:txBody>
-          <a:bodyPr/>
-          <a:lstStyle/>
-          <a:p>
-            <a:r>
-              <a:t>cashflow figures</a:t>
-            </a:r>
-          </a:p>
-        </p:txBody>
-      </p:sp>
-      <p:sp>
-        <p:nvSpPr>
-          <p:cNvPr id="3" name="Content Placeholder 2"/>
-          <p:cNvSpPr>
-            <a:spLocks noGrp="1"/>
-          </p:cNvSpPr>
-          <p:nvPr>
-            <p:ph idx="1"/>
-          </p:nvPr>
-        </p:nvSpPr>
-        <p:spPr/>
-        <p:txBody>
-          <a:bodyPr/>
-          <a:lstStyle/>
-          <a:p/>
-        </p:txBody>
-      </p:sp>
-      <p:pic>
-        <p:nvPicPr>
-          <p:cNvPr id="4" name="Picture 3" descr="cashflow_1.png"/>
-          <p:cNvPicPr>
-            <a:picLocks noChangeAspect="1"/>
-          </p:cNvPicPr>
-          <p:nvPr/>
-        </p:nvPicPr>
-        <p:blipFill>
-          <a:blip r:embed="rId2"/>
-          <a:stretch>
-            <a:fillRect/>
-          </a:stretch>
-        </p:blipFill>
-        <p:spPr>
-          <a:xfrm>
-            <a:off x="914400" y="1371600"/>
-            <a:ext cx="4572000" cy="2743200"/>
-          </a:xfrm>
-          <a:prstGeom prst="rect">
-            <a:avLst/>
-          </a:prstGeom>
-        </p:spPr>
-      </p:pic>
-      <p:pic>
-        <p:nvPicPr>
-          <p:cNvPr id="5" name="Picture 4" descr="cashflow_3.png"/>
-          <p:cNvPicPr>
-            <a:picLocks noChangeAspect="1"/>
-          </p:cNvPicPr>
-          <p:nvPr/>
-        </p:nvPicPr>
-        <p:blipFill>
-          <a:blip r:embed="rId3"/>
-          <a:stretch>
-            <a:fillRect/>
-          </a:stretch>
-        </p:blipFill>
-        <p:spPr>
-          <a:xfrm>
-            <a:off x="5943600" y="1371600"/>
-            <a:ext cx="4572000" cy="2743200"/>
-          </a:xfrm>
-          <a:prstGeom prst="rect">
-            <a:avLst/>
-          </a:prstGeom>
-        </p:spPr>
-      </p:pic>
-      <p:pic>
-        <p:nvPicPr>
-          <p:cNvPr id="6" name="Picture 5" descr="cashflow_2.png"/>
-          <p:cNvPicPr>
-            <a:picLocks noChangeAspect="1"/>
-          </p:cNvPicPr>
-          <p:nvPr/>
-        </p:nvPicPr>
-        <p:blipFill>
-          <a:blip r:embed="rId4"/>
-          <a:stretch>
-            <a:fillRect/>
-          </a:stretch>
-        </p:blipFill>
-        <p:spPr>
-          <a:xfrm>
-            <a:off x="914400" y="4114800"/>
-            <a:ext cx="4572000" cy="2743200"/>
-          </a:xfrm>
-          <a:prstGeom prst="rect">
-            <a:avLst/>
-          </a:prstGeom>
-        </p:spPr>
-      </p:pic>
-    </p:spTree>
-  </p:cSld>
-  <p:clrMapOvr>
-    <a:masterClrMapping/>
-  </p:clrMapOvr>
-</p:sld>
-</file>
-
 <file path=ppt/slides/slide2.xml><?xml version="1.0" encoding="utf-8"?>
 <p:sld xmlns:a="http://schemas.openxmlformats.org/drawingml/2006/main" xmlns:p="http://schemas.openxmlformats.org/presentationml/2006/main" xmlns:r="http://schemas.openxmlformats.org/officeDocument/2006/relationships">
   <p:cSld>
@@ -4463,7 +3940,7 @@
           <a:lstStyle/>
           <a:p>
             <a:r>
-              <a:t>Amazon's business overview has consistently evolved to adapt to market trends and customer demands. Initially, Amazon started as an online book retailer in 1994, aiming to offer a broader selection and greater convenience than physical bookstores. With a dogged focus on customer satisfaction, Amazon swiftly expanded into various product categories and started offering millions of unique products through both its direct sales and third-party sellers. In recent years, Amazon has honed its logistics and warehousing capabilities, which allowed it to provide faster delivery services. This includes co-sourced and outsourced arrangements globally. Amazon Web Services (AWS), launched in 2006, has grown into one of the company's most profitable segments, offering computing power, storage, and various other services to enterprises of all sizes . Amazon has also ventured into the grocery sector with Amazon Fresh and acquired Whole Foods Market in 2017, aiming to capture more of the grocery market by blending online convenience with physical stores . More recently, they have introduced Amazon Business, targeting enterprise customers by streamlining procurement processes across office supplies and more . Moreover, the company is continually exploring new ventures like healthcare with Amazon Pharmacy and tech innovation initiatives such as Project Kuiper. This dynamic strategy highlights Amazon's adaptive business model and relentless focus on innovation and customer satisfaction.</a:t>
+              <a:t>Amazon's business has significantly evolved over time, reflecting diversification and expansion. Initially focusing on book sales, Amazon increased its product range and introduced new features like 1-Click shopping and gift certificates. By 2022-2023, it offered an extensive range of products through both in-house and third-party sellers, and services including AWS, fulfillment, and advertising.  Investments in grocery and physical stores through Whole Foods and Amazon Fresh signify a strategic move to capture a more substantial share of the $800 billion US grocery market. Amazon also deepened its business-to-business engagement with Amazon Business launched in 2015, achieving $35 billion in annualized gross sales by 2022. Recent ventures such as Amazon Pharmacy and the satellite internet initiative Kuiper show a continued drive to diversify beyond traditional e-commerce. Overall, Amazon's business strategy has shifted from a single-category online retailer to a multi-dimensional service provider and global retail giant.</a:t>
             </a:r>
           </a:p>
         </p:txBody>
@@ -4523,7 +4000,7 @@
           <a:lstStyle/>
           <a:p>
             <a:r>
-              <a:t>Amazon's revenue has shown significant growth over the years 2020 to 2022, with varying rates across different segments and regions. In 2020, the company reported total net sales of $386.1 billion, which increased by 21% to $469.8 billion in 2021, and then further by 9.4% to $514.0 billion in 2022. Breaking down by segments, North America generated $236.3 billion, $279.8 billion, and $315.9 billion in net sales for 2020, 2021, and 2022 respectively, showing consistent growth. The International segment reached $104.4 billion in 2020, peaking at $127.8 billion in 2021 before dropping to $118.0 billion in 2022 due to currency fluctuations. Amazon Web Services (AWS) also saw significant growth with net sales of $45.4 billion in 2020, rising to $62.2 billion in 2021 and $80.1 billion in 2022, demonstrating its role as a key driver of Amazon's revenue growth.</a:t>
+              <a:t>Amazon's revenue has shown significant growth over recent years. In 2020, the total revenue was $386.06 billion. This increased to $469.82 billion in 2021, reflecting a year-over-year growth of 22%. By 2022, Amazon's revenue had further increased to $513.98 billion, marking a 9% rise from the previous year. In 2023, the revenue continued its upward trend, reaching $574.79 billion, representing a 12% increase from 2022. The revenue contributions come from various segments, including North America, International, and AWS. In 2023, North America generated $352.83 billion, International contributed $131.20 billion, and AWS had $90.76 billion in revenue. The year-over-year growth rates for these segments in 2023 were 12%, 11%, and 13%, respectively. This consistent increase in revenue highlights Amazon's robust business model, leveraging its diverse revenue streams, including retail sales, third-party seller services, subscription services, advertising services, and AWS. This strong performance demonstrates Amazon's ability to adapt and thrive in varying economic conditions and maintain its global market leadership.</a:t>
             </a:r>
           </a:p>
         </p:txBody>
@@ -4562,7 +4039,7 @@
           <a:lstStyle/>
           <a:p>
             <a:r>
-              <a:t>revenue figures</a:t>
+              <a:t>Operating Income</a:t>
             </a:r>
           </a:p>
         </p:txBody>
@@ -4579,35 +4056,15 @@
         </p:nvSpPr>
         <p:spPr/>
         <p:txBody>
-          <a:bodyPr/>
+          <a:bodyPr wrap="square"/>
           <a:lstStyle/>
-          <a:p/>
-        </p:txBody>
-      </p:sp>
-      <p:pic>
-        <p:nvPicPr>
-          <p:cNvPr id="4" name="Picture 3" descr="revenue_1.png"/>
-          <p:cNvPicPr>
-            <a:picLocks noChangeAspect="1"/>
-          </p:cNvPicPr>
-          <p:nvPr/>
-        </p:nvPicPr>
-        <p:blipFill>
-          <a:blip r:embed="rId2"/>
-          <a:stretch>
-            <a:fillRect/>
-          </a:stretch>
-        </p:blipFill>
-        <p:spPr>
-          <a:xfrm>
-            <a:off x="914400" y="1371600"/>
-            <a:ext cx="4572000" cy="2743200"/>
-          </a:xfrm>
-          <a:prstGeom prst="rect">
-            <a:avLst/>
-          </a:prstGeom>
-        </p:spPr>
-      </p:pic>
+          <a:p>
+            <a:r>
+              <a:t>From the financial statements provided, Amazon's operating income has experienced notable fluctuations over recent years. In 2020, the operating income was $22.9 billion, which increased to $24.9 billion in 2021. However, 2022 saw a significant reduction to $12.2 billion, marking a substantial decline. This reduction was primarily caused by increased operating expenses, particularly in North America and International segments. By 2023, the consolidated operating income rebounded strongly to $36.9 billion, driven by improvements in all segments: North America, International, and AWS. Specifically, North America saw a dramatic shift from a loss of $2.8 billion in 2022 to an income of $14.9 billion in 2023. The International segment, though still at a loss, improved considerably from a loss of $7.7 billion in 2022 to $2.7 billion in 2023. AWS consistently performed well, with its operating income increasing from $22.8 billion in 2022 to $24.6 billion in 2023.</a:t>
+            </a:r>
+          </a:p>
+        </p:txBody>
+      </p:sp>
     </p:spTree>
   </p:cSld>
   <p:clrMapOvr>
@@ -4642,7 +4099,7 @@
           <a:lstStyle/>
           <a:p>
             <a:r>
-              <a:t>Operating Income</a:t>
+              <a:t>PBT Margin</a:t>
             </a:r>
           </a:p>
         </p:txBody>
@@ -4663,7 +4120,7 @@
           <a:lstStyle/>
           <a:p>
             <a:r>
-              <a:t>The operating income of Amazon.com, Inc. has fluctuated significantly over the years. In 2020, the operating income was $22.9 billion. This figure rose to $24.9 billion in 2021 but then dramatically fell to $12.2 billion in 2022.  For a more detailed breakdown, the North America segment experienced an operating income of $8.7 billion in 2020, which decreased to $7.3 billion in 2021, and sharply turned into a loss of $2.8 billion in 2022. The International segment saw a modest operating income of $0.7 billion in 2020, turned to a loss of $0.9 billion in 2021, and significantly worsened to a loss of $7.7 billion in 2022. On the other hand, the AWS segment consistently grew, with operating incomes of $13.5 billion in 2020, $18.5 billion in 2021, and $22.8 billion in 2022. The drastic decline in operating income for 2022 was primarily due to increased fulfillment and shipping costs, investments in the fulfillment network, wage rate increases, and higher technology and content costs. Conversely, AWS's improved performance was mainly driven by increased sales and cost structure productivity.</a:t>
+              <a:t>The Profit Before Tax (PBT) Margin is an important metric to assess a company's profitability before accounting for income taxes. Based on the data provided: 1. In 2021, Amazon reported an operating income of $24.9 billion with consolidated net sales of $469.822 billion. The PBT Margin for 2021 is approximately 5.30%. 2. In 2022, Amazon's operating income decreased to $12.248 billion while the net sales increased to $513.983 billion. The PBT Margin for 2022 is approximately 2.38%. 3. In 2023, Amazon's operating income significantly increased to $36.852 billion with net sales reaching $574.785 billion. The PBT Margin for 2023 is approximately 6.41%. To calculate the PBT Margin, the formula used is: \[ \text{PBT Margin} = \frac{\text{Operating Income}}{\text{Net Sales}} \times 100 \] For 2021: \[ \text{PBT Margin 2021} = \left( \frac{24.9}{469.822} \right) \times 100 = 5.30\% \] For 2022: \[ \text{PBT Margin 2022} = \left( \frac{12.248}{513.983} \right) \times 100 = 2.38\% \] For 2023: \[ \text{PBT Margin 2023} = \left( \frac{36.852}{574.785} \right) \times 100 = 6.41\% \] The PBT Margin saw a decline from 2021 to 2022 but recovered significantly by 2023, indicating improved profitability despite challenging market conditions in 2022.</a:t>
             </a:r>
           </a:p>
         </p:txBody>
@@ -4702,7 +4159,7 @@
           <a:lstStyle/>
           <a:p>
             <a:r>
-              <a:t>operatingincome figures</a:t>
+              <a:t>revenue figures</a:t>
             </a:r>
           </a:p>
         </p:txBody>
@@ -4726,7 +4183,7 @@
       </p:sp>
       <p:pic>
         <p:nvPicPr>
-          <p:cNvPr id="4" name="Picture 3" descr="operatingincome_1.png"/>
+          <p:cNvPr id="4" name="Picture 3" descr="revenue_2.png"/>
           <p:cNvPicPr>
             <a:picLocks noChangeAspect="1"/>
           </p:cNvPicPr>
@@ -4741,6 +4198,30 @@
         <p:spPr>
           <a:xfrm>
             <a:off x="914400" y="1371600"/>
+            <a:ext cx="4572000" cy="2743200"/>
+          </a:xfrm>
+          <a:prstGeom prst="rect">
+            <a:avLst/>
+          </a:prstGeom>
+        </p:spPr>
+      </p:pic>
+      <p:pic>
+        <p:nvPicPr>
+          <p:cNvPr id="5" name="Picture 4" descr="revenue_1.png"/>
+          <p:cNvPicPr>
+            <a:picLocks noChangeAspect="1"/>
+          </p:cNvPicPr>
+          <p:nvPr/>
+        </p:nvPicPr>
+        <p:blipFill>
+          <a:blip r:embed="rId3"/>
+          <a:stretch>
+            <a:fillRect/>
+          </a:stretch>
+        </p:blipFill>
+        <p:spPr>
+          <a:xfrm>
+            <a:off x="5943600" y="1371600"/>
             <a:ext cx="4572000" cy="2743200"/>
           </a:xfrm>
           <a:prstGeom prst="rect">
@@ -4782,7 +4263,7 @@
           <a:lstStyle/>
           <a:p>
             <a:r>
-              <a:t>Cash Flow</a:t>
+              <a:t>operatingincome figures</a:t>
             </a:r>
           </a:p>
         </p:txBody>
@@ -4799,15 +4280,59 @@
         </p:nvSpPr>
         <p:spPr/>
         <p:txBody>
-          <a:bodyPr wrap="square"/>
+          <a:bodyPr/>
           <a:lstStyle/>
-          <a:p>
-            <a:r>
-              <a:t>Amazon's cash flow has shown substantial variability and changes over the years.  Operating Activities: - 2020: $66.1 billion - 2021: $46.3 billion - 2022: $46.8 billion The decrease from 2020 to 2021 and stability from 2021 to 2022 is primarily attributed to changes in net income, excluding non-cash expenses, and fluctuations in working capital. Investing Activities: - 2020: $(59.6) billion - 2021: $(58.2) billion - 2022: $(37.6) billion Amazon's cash used in investing activities primarily reflects significant investments in technology infrastructure and capacity to support the AWS business growth and fulfillment network. Financing Activities: - 2020: $(1.1) billion - 2021: $6.3 billion - 2022: $9.7 billion The increase is mainly due to proceeds from long-term debt and short-term debt. Notably, there were repayments of finance leases and financing obligations. Free Cash Flow: - 2021: $(9.1) billion - 2022: $(11.6) billion The decline in free cash flow reflects the growing expenditures on property and equipment. Overall, Amazon’s strategy to focus on long-term growth through substantial capital investments while maintaining solid operating cash flow underpins its cash flow trends.  This wide-ranging approach ensures liquidity and supports the company’s expansive initiatives across its varied businesses.</a:t>
-            </a:r>
-          </a:p>
-        </p:txBody>
-      </p:sp>
+          <a:p/>
+        </p:txBody>
+      </p:sp>
+      <p:pic>
+        <p:nvPicPr>
+          <p:cNvPr id="4" name="Picture 3" descr="operatingincome_2.png"/>
+          <p:cNvPicPr>
+            <a:picLocks noChangeAspect="1"/>
+          </p:cNvPicPr>
+          <p:nvPr/>
+        </p:nvPicPr>
+        <p:blipFill>
+          <a:blip r:embed="rId2"/>
+          <a:stretch>
+            <a:fillRect/>
+          </a:stretch>
+        </p:blipFill>
+        <p:spPr>
+          <a:xfrm>
+            <a:off x="914400" y="1371600"/>
+            <a:ext cx="4572000" cy="2743200"/>
+          </a:xfrm>
+          <a:prstGeom prst="rect">
+            <a:avLst/>
+          </a:prstGeom>
+        </p:spPr>
+      </p:pic>
+      <p:pic>
+        <p:nvPicPr>
+          <p:cNvPr id="5" name="Picture 4" descr="operatingincome_1.png"/>
+          <p:cNvPicPr>
+            <a:picLocks noChangeAspect="1"/>
+          </p:cNvPicPr>
+          <p:nvPr/>
+        </p:nvPicPr>
+        <p:blipFill>
+          <a:blip r:embed="rId3"/>
+          <a:stretch>
+            <a:fillRect/>
+          </a:stretch>
+        </p:blipFill>
+        <p:spPr>
+          <a:xfrm>
+            <a:off x="5943600" y="1371600"/>
+            <a:ext cx="4572000" cy="2743200"/>
+          </a:xfrm>
+          <a:prstGeom prst="rect">
+            <a:avLst/>
+          </a:prstGeom>
+        </p:spPr>
+      </p:pic>
     </p:spTree>
   </p:cSld>
   <p:clrMapOvr>
@@ -4842,7 +4367,7 @@
           <a:lstStyle/>
           <a:p>
             <a:r>
-              <a:t>cashflow figures</a:t>
+              <a:t>pbtmargin figures</a:t>
             </a:r>
           </a:p>
         </p:txBody>
@@ -4866,7 +4391,7 @@
       </p:sp>
       <p:pic>
         <p:nvPicPr>
-          <p:cNvPr id="4" name="Picture 3" descr="cashflow_1.png"/>
+          <p:cNvPr id="4" name="Picture 3" descr="pbtmargin_1.png"/>
           <p:cNvPicPr>
             <a:picLocks noChangeAspect="1"/>
           </p:cNvPicPr>
@@ -4888,114 +4413,6 @@
           </a:prstGeom>
         </p:spPr>
       </p:pic>
-      <p:pic>
-        <p:nvPicPr>
-          <p:cNvPr id="5" name="Picture 4" descr="cashflow_3.png"/>
-          <p:cNvPicPr>
-            <a:picLocks noChangeAspect="1"/>
-          </p:cNvPicPr>
-          <p:nvPr/>
-        </p:nvPicPr>
-        <p:blipFill>
-          <a:blip r:embed="rId3"/>
-          <a:stretch>
-            <a:fillRect/>
-          </a:stretch>
-        </p:blipFill>
-        <p:spPr>
-          <a:xfrm>
-            <a:off x="5943600" y="1371600"/>
-            <a:ext cx="4572000" cy="2743200"/>
-          </a:xfrm>
-          <a:prstGeom prst="rect">
-            <a:avLst/>
-          </a:prstGeom>
-        </p:spPr>
-      </p:pic>
-      <p:pic>
-        <p:nvPicPr>
-          <p:cNvPr id="6" name="Picture 5" descr="cashflow_2.png"/>
-          <p:cNvPicPr>
-            <a:picLocks noChangeAspect="1"/>
-          </p:cNvPicPr>
-          <p:nvPr/>
-        </p:nvPicPr>
-        <p:blipFill>
-          <a:blip r:embed="rId4"/>
-          <a:stretch>
-            <a:fillRect/>
-          </a:stretch>
-        </p:blipFill>
-        <p:spPr>
-          <a:xfrm>
-            <a:off x="914400" y="4114800"/>
-            <a:ext cx="4572000" cy="2743200"/>
-          </a:xfrm>
-          <a:prstGeom prst="rect">
-            <a:avLst/>
-          </a:prstGeom>
-        </p:spPr>
-      </p:pic>
-    </p:spTree>
-  </p:cSld>
-  <p:clrMapOvr>
-    <a:masterClrMapping/>
-  </p:clrMapOvr>
-</p:sld>
-</file>
-
-<file path=ppt/slides/slide9.xml><?xml version="1.0" encoding="utf-8"?>
-<p:sld xmlns:a="http://schemas.openxmlformats.org/drawingml/2006/main" xmlns:p="http://schemas.openxmlformats.org/presentationml/2006/main" xmlns:r="http://schemas.openxmlformats.org/officeDocument/2006/relationships">
-  <p:cSld>
-    <p:spTree>
-      <p:nvGrpSpPr>
-        <p:cNvPr id="1" name=""/>
-        <p:cNvGrpSpPr/>
-        <p:nvPr/>
-      </p:nvGrpSpPr>
-      <p:grpSpPr/>
-      <p:sp>
-        <p:nvSpPr>
-          <p:cNvPr id="2" name="Title 1"/>
-          <p:cNvSpPr>
-            <a:spLocks noGrp="1"/>
-          </p:cNvSpPr>
-          <p:nvPr>
-            <p:ph type="title"/>
-          </p:nvPr>
-        </p:nvSpPr>
-        <p:spPr/>
-        <p:txBody>
-          <a:bodyPr/>
-          <a:lstStyle/>
-          <a:p>
-            <a:r>
-              <a:t>Business Overview</a:t>
-            </a:r>
-          </a:p>
-        </p:txBody>
-      </p:sp>
-      <p:sp>
-        <p:nvSpPr>
-          <p:cNvPr id="3" name="Content Placeholder 2"/>
-          <p:cNvSpPr>
-            <a:spLocks noGrp="1"/>
-          </p:cNvSpPr>
-          <p:nvPr>
-            <p:ph idx="1"/>
-          </p:nvPr>
-        </p:nvSpPr>
-        <p:spPr/>
-        <p:txBody>
-          <a:bodyPr wrap="square"/>
-          <a:lstStyle/>
-          <a:p>
-            <a:r>
-              <a:t>Amazon's business overview has evolved significantly since its inception in 1994. Originally an online bookstore, Amazon quickly expanded its product lines to include categories like music, video, electronics, and toys by the late 1990s. This product diversification was complemented by geographical expansion, including entering markets in Europe, Asia, and South America. Over the years, Amazon ventured into diverse sectors. The launch of Amazon Web Services (AWS) in 2006 revolutionized cloud computing, making it a significant profit center. Further investments in logistics and fulfillment networks enhanced its delivery capabilities, including same-day and two-day shipping. The acquisition of Whole Foods Market in 2017 marked its entry into the grocery sector, alongside the development of Amazon Fresh, aiming to blend online and physical grocery experiences. Amazon has also made strides in healthcare with the launch of Amazon Pharmacy in 2020 and the acquisition of One Medical in 2022, reflecting its ambition to improve primary care experiences. The introduction of innovative initiatives like Project Kuiper, aimed at providing global broadband, exemplifies Amazon's long-term vision and continuous innovation. Overall, Amazon's adaptive strategy and relentless focus on customer satisfaction have fueled its growth and diversification.</a:t>
-            </a:r>
-          </a:p>
-        </p:txBody>
-      </p:sp>
     </p:spTree>
   </p:cSld>
   <p:clrMapOvr>

</xml_diff>

<commit_message>
moved docker compose to top level
</commit_message>
<xml_diff>
--- a/fastapi-backend/app/pres/output.pptx
+++ b/fastapi-backend/app/pres/output.pptx
@@ -3875,7 +3875,7 @@
           <a:lstStyle/>
           <a:p>
             <a:r>
-              <a:t>Amazon.Com, Inc. Analysis</a:t>
+              <a:t>Amazon.com, Inc. Analysis</a:t>
             </a:r>
           </a:p>
         </p:txBody>
@@ -3940,7 +3940,7 @@
           <a:lstStyle/>
           <a:p>
             <a:r>
-              <a:t>Amazon's business has significantly evolved over time, reflecting diversification and expansion. Initially focusing on book sales, Amazon increased its product range and introduced new features like 1-Click shopping and gift certificates. By 2022-2023, it offered an extensive range of products through both in-house and third-party sellers, and services including AWS, fulfillment, and advertising.  Investments in grocery and physical stores through Whole Foods and Amazon Fresh signify a strategic move to capture a more substantial share of the $800 billion US grocery market. Amazon also deepened its business-to-business engagement with Amazon Business launched in 2015, achieving $35 billion in annualized gross sales by 2022. Recent ventures such as Amazon Pharmacy and the satellite internet initiative Kuiper show a continued drive to diversify beyond traditional e-commerce. Overall, Amazon's business strategy has shifted from a single-category online retailer to a multi-dimensional service provider and global retail giant.</a:t>
+              <a:t>Amazon's business overview has evolved significantly over time. Initially launched as an online bookstore in 1994, the company rapidly expanded to offer a wide range of products, including electronics, apparel, and home goods. By leveraging technology and focusing on customer experience, Amazon introduced features like customer reviews, personalized recommendations, and one-click purchasing. Over the years, the company diversified its business model, entering new markets such as cloud computing with Amazon Web Services (AWS) in 2006, which quickly became a significant revenue driver. In addition to e-commerce and cloud services, Amazon ventured into physical retail with the acquisition of Whole Foods Market in 2017, aiming to revolutionize grocery shopping. Amazon also explored healthcare services and digital advertising. Through acquisitions and strategic investments, the company continually broadened its product and service offerings, enhancing convenience and value for customers. The strategic emphasis on innovation, customer focus, and operational excellence has been the cornerstone of Amazon's growth, transforming it from a simple online retailer into a global technology giant dominating various sectors such as e-commerce, cloud computing, and digital services.</a:t>
             </a:r>
           </a:p>
         </p:txBody>
@@ -4000,7 +4000,7 @@
           <a:lstStyle/>
           <a:p>
             <a:r>
-              <a:t>Amazon's revenue has shown significant growth over recent years. In 2020, the total revenue was $386.06 billion. This increased to $469.82 billion in 2021, reflecting a year-over-year growth of 22%. By 2022, Amazon's revenue had further increased to $513.98 billion, marking a 9% rise from the previous year. In 2023, the revenue continued its upward trend, reaching $574.79 billion, representing a 12% increase from 2022. The revenue contributions come from various segments, including North America, International, and AWS. In 2023, North America generated $352.83 billion, International contributed $131.20 billion, and AWS had $90.76 billion in revenue. The year-over-year growth rates for these segments in 2023 were 12%, 11%, and 13%, respectively. This consistent increase in revenue highlights Amazon's robust business model, leveraging its diverse revenue streams, including retail sales, third-party seller services, subscription services, advertising services, and AWS. This strong performance demonstrates Amazon's ability to adapt and thrive in varying economic conditions and maintain its global market leadership.</a:t>
+              <a:t>Between 2020 and 2022, Amazon's revenue exhibited substantial growth, reflecting the company's expanding market presence and diversified offerings. The total consolidated revenue increased from $386.06 billion in 2020 to $469.82 billion in 2021, and further to $513.98 billion in 2022.  North America consistently contributed the largest segment of net sales, growing from $236.28 billion in 2020 to $279.83 billion in 2021, and reaching $315.88 billion in 2022. The AWS (Amazon Web Services) segment followed, with impressive growth from $45.37 billion in 2020 to $62.20 billion in 2021, and $80.10 billion in 2022. This growth was primarily driven by increased customer usage, despite some pricing changes. Meanwhile, the International segment grew from $104.41 billion in 2020 to $127.79 billion in 2021, but saw a decline to $118.01 billion in 2022, reflecting the impact of foreign currency exchange rate changes. Overall, Amazon's diverse revenue streams from online and physical stores, third-party seller services, subscription services, advertising, and AWS have enabled consistent revenue growth over the observed period.</a:t>
             </a:r>
           </a:p>
         </p:txBody>
@@ -4039,7 +4039,7 @@
           <a:lstStyle/>
           <a:p>
             <a:r>
-              <a:t>Operating Income</a:t>
+              <a:t>PBT MARGIN</a:t>
             </a:r>
           </a:p>
         </p:txBody>
@@ -4060,7 +4060,7 @@
           <a:lstStyle/>
           <a:p>
             <a:r>
-              <a:t>From the financial statements provided, Amazon's operating income has experienced notable fluctuations over recent years. In 2020, the operating income was $22.9 billion, which increased to $24.9 billion in 2021. However, 2022 saw a significant reduction to $12.2 billion, marking a substantial decline. This reduction was primarily caused by increased operating expenses, particularly in North America and International segments. By 2023, the consolidated operating income rebounded strongly to $36.9 billion, driven by improvements in all segments: North America, International, and AWS. Specifically, North America saw a dramatic shift from a loss of $2.8 billion in 2022 to an income of $14.9 billion in 2023. The International segment, though still at a loss, improved considerably from a loss of $7.7 billion in 2022 to $2.7 billion in 2023. AWS consistently performed well, with its operating income increasing from $22.8 billion in 2022 to $24.6 billion in 2023.</a:t>
+              <a:t>The PBT (Profit Before Tax) margin of Amazon has exhibited significant changes over the years. Here is the data extracted from the financial statements: Years for Analysis: - 2020, 2021, and 2022 PBT Calculation: PBT is derived by taking the operating income and adding/subtracting other non-operating incomes/expenses. Data from 2020 to 2022: - 2020:   - Operating Income: $22.9 billion   - Other Income (Expense), Net: $2.3 billion   - Revenue: $386.1 billion   - Sum: $25.2 billion   - PBT Margin = 25.2 / 386.1 = 6.5% - 2021:   - Operating Income: $24.9 billion   - Other Income (Expense), Net: $14.6 billion   - Revenue: $469.8 billion   - Sum: $39.5 billion   - PBT Margin = 39.5 / 469.8 = 8.4% - 2022:   - Operating Income: $12.2 billion   - Other Income (Expense), Net: $(16.8) billion (loss)   - Revenue: $514.0 billion   - Sum: $(4.6) billion (loss)   - PBT Margin = -4.6 / 514.0 = -0.9% Analysis: From the data above, the PBT margin saw an increasing trend from 2020 (6.5%) to 2021 (8.4%), due to a substantial rise in other income. However, in 2022, Amazon experienced a dramatic decline to a negative PBT margin (-0.9%), mainly attributed to significant losses in other income, reflecting challenges in marketable equity security valuations and increased operating expenses. This illustrates how variability in both operational performance and non-operational factors such as market investments can affect Amazon's financial health across years.</a:t>
             </a:r>
           </a:p>
         </p:txBody>
@@ -4099,7 +4099,7 @@
           <a:lstStyle/>
           <a:p>
             <a:r>
-              <a:t>PBT Margin</a:t>
+              <a:t>Operating Income</a:t>
             </a:r>
           </a:p>
         </p:txBody>
@@ -4120,7 +4120,7 @@
           <a:lstStyle/>
           <a:p>
             <a:r>
-              <a:t>The Profit Before Tax (PBT) Margin is an important metric to assess a company's profitability before accounting for income taxes. Based on the data provided: 1. In 2021, Amazon reported an operating income of $24.9 billion with consolidated net sales of $469.822 billion. The PBT Margin for 2021 is approximately 5.30%. 2. In 2022, Amazon's operating income decreased to $12.248 billion while the net sales increased to $513.983 billion. The PBT Margin for 2022 is approximately 2.38%. 3. In 2023, Amazon's operating income significantly increased to $36.852 billion with net sales reaching $574.785 billion. The PBT Margin for 2023 is approximately 6.41%. To calculate the PBT Margin, the formula used is: \[ \text{PBT Margin} = \frac{\text{Operating Income}}{\text{Net Sales}} \times 100 \] For 2021: \[ \text{PBT Margin 2021} = \left( \frac{24.9}{469.822} \right) \times 100 = 5.30\% \] For 2022: \[ \text{PBT Margin 2022} = \left( \frac{12.248}{513.983} \right) \times 100 = 2.38\% \] For 2023: \[ \text{PBT Margin 2023} = \left( \frac{36.852}{574.785} \right) \times 100 = 6.41\% \] The PBT Margin saw a decline from 2021 to 2022 but recovered significantly by 2023, indicating improved profitability despite challenging market conditions in 2022.</a:t>
+              <a:t>Amazon's Operating Income has shown significant fluctuations over the observed timeframe. It increased from $22.9 billion in 2020 to $24.9 billion in 2021 before decreasing dramatically to $12.2 billion in 2022.  Breaking it down by segment, the North America segment's operating income decreased from $7.3 billion in 2021 to a loss of $2.8 billion in 2022. This decline is primarily attributed to increased fulfillment and shipping costs, as well as higher technology, content and operational expenses. The International segment fared worse, shifting from a loss of $0.9 billion in 2021 to a loss of $7.7 billion in 2022. The substantial increase in loss is mainly due to elevated fulfillment and shipping costs and the negative impact of changes in foreign currency exchange rates. Conversely, AWS has demonstrated continuous growth, with operating income climbing from $13.5 billion in 2020 to $18.5 billion in 2021, and further to $22.8 billion in 2022. Improvements in cost structure productivity and increased sales volume contribute to this positive trend, indicating a robust performance in the AWS segment.</a:t>
             </a:r>
           </a:p>
         </p:txBody>

</xml_diff>

<commit_message>
compose and updated powerpoint
</commit_message>
<xml_diff>
--- a/fastapi-backend/app/pres/output.pptx
+++ b/fastapi-backend/app/pres/output.pptx
@@ -8,11 +8,12 @@
     <p:sldId id="256" r:id="rId2"/>
     <p:sldId id="257" r:id="rId7"/>
     <p:sldId id="258" r:id="rId8"/>
+    <p:sldId id="261" r:id="rId11"/>
     <p:sldId id="259" r:id="rId9"/>
+    <p:sldId id="262" r:id="rId12"/>
     <p:sldId id="260" r:id="rId10"/>
-    <p:sldId id="261" r:id="rId11"/>
-    <p:sldId id="262" r:id="rId12"/>
     <p:sldId id="263" r:id="rId13"/>
+    <p:sldId id="264" r:id="rId14"/>
   </p:sldIdLst>
   <p:sldSz cx="12192000" cy="6858000"/>
   <p:notesSz cx="6858000" cy="9144000"/>
@@ -3875,7 +3876,7 @@
           <a:lstStyle/>
           <a:p>
             <a:r>
-              <a:t>Amazon.com, Inc. Analysis</a:t>
+              <a:t>Amazon.Com, Inc. 【4:0†source】【4:1†source】. Analysis</a:t>
             </a:r>
           </a:p>
         </p:txBody>
@@ -3940,7 +3941,7 @@
           <a:lstStyle/>
           <a:p>
             <a:r>
-              <a:t>Amazon's business overview has evolved significantly over time. Initially launched as an online bookstore in 1994, the company rapidly expanded to offer a wide range of products, including electronics, apparel, and home goods. By leveraging technology and focusing on customer experience, Amazon introduced features like customer reviews, personalized recommendations, and one-click purchasing. Over the years, the company diversified its business model, entering new markets such as cloud computing with Amazon Web Services (AWS) in 2006, which quickly became a significant revenue driver. In addition to e-commerce and cloud services, Amazon ventured into physical retail with the acquisition of Whole Foods Market in 2017, aiming to revolutionize grocery shopping. Amazon also explored healthcare services and digital advertising. Through acquisitions and strategic investments, the company continually broadened its product and service offerings, enhancing convenience and value for customers. The strategic emphasis on innovation, customer focus, and operational excellence has been the cornerstone of Amazon's growth, transforming it from a simple online retailer into a global technology giant dominating various sectors such as e-commerce, cloud computing, and digital services.</a:t>
+              <a:t>Amazon has consistently evolved its business model and strategic focus over time. Initially, the company started as an online book retailer, emphasizing vast selection, customer convenience, and competitive pricing. By 1997, sales had grown significantly, and Amazon expanded its product offerings. In recent years, Amazon has diversified into various sectors beyond traditional e-commerce. For example, Amazon Business was launched in 2015 and has grown to deliver approximately $35 billion in annualized gross sales. The company has also ventured into the grocery sector, particularly with Amazon Fresh and the acquisition of Whole Foods Market, indicating a strategic shift to address more of the customer’s grocery needs through both online and physical stores. Moreover, the introduction of Buy with Prime aims to enhance third-party merchants' sales by leveraging Amazon's logistics and Prime membership benefits. Another significant change in Amazon's business is its investment in the healthcare industry, marked by the launch of Amazon Pharmacy in 2020, which offers online pharmacy services. Additionally, Amazon continues to strengthen its cloud computing arm, AWS, serving a broad array of customers from startups to large enterprises. Overall, Amazon has transformed from a niche online retailer to a diversified global conglomerate, expanding into new markets and leveraging its core competencies to innovate and grow in various sectors.</a:t>
             </a:r>
           </a:p>
         </p:txBody>
@@ -4000,7 +4001,7 @@
           <a:lstStyle/>
           <a:p>
             <a:r>
-              <a:t>Between 2020 and 2022, Amazon's revenue exhibited substantial growth, reflecting the company's expanding market presence and diversified offerings. The total consolidated revenue increased from $386.06 billion in 2020 to $469.82 billion in 2021, and further to $513.98 billion in 2022.  North America consistently contributed the largest segment of net sales, growing from $236.28 billion in 2020 to $279.83 billion in 2021, and reaching $315.88 billion in 2022. The AWS (Amazon Web Services) segment followed, with impressive growth from $45.37 billion in 2020 to $62.20 billion in 2021, and $80.10 billion in 2022. This growth was primarily driven by increased customer usage, despite some pricing changes. Meanwhile, the International segment grew from $104.41 billion in 2020 to $127.79 billion in 2021, but saw a decline to $118.01 billion in 2022, reflecting the impact of foreign currency exchange rate changes. Overall, Amazon's diverse revenue streams from online and physical stores, third-party seller services, subscription services, advertising, and AWS have enabled consistent revenue growth over the observed period.</a:t>
+              <a:t>Amazon's revenue has shown significant growth over the years, with some fluctuations specific to business segments and global economic conditions. Consolidated net sales increased from $386.064 billion in 2020 to $469.822 billion in 2021, and further to $513.983 billion in 2022. This represents an increase of approximately 21.68% in 2021 and a moderate increase of 9.4% in 2022. A detailed breakdown reveals a mixed performance across geographic segments and business units. North America sales rose from $236.282 billion in 2020 to $279.833 billion in 2021, and to $315.880 billion in 2022. On the other hand, international sales grew from $104.412 billion in 2020 to $127.787 billion in 2021 but decreased to $118.007 billion in 2022 due in part to foreign currency impacts. AWS (Amazon Web Services) showed robust growth, ascending from $45.370 billion in 2020 to $62.202 billion in 2021, and $80.096 billion in 2022. Overall, while Amazon experienced strong revenue growth from 2020 to 2021, the growth rate decelerated in 2022 primarily due to macroeconomic pressures and foreign exchange rate impacts, particularly on international sales.</a:t>
             </a:r>
           </a:p>
         </p:txBody>
@@ -4039,7 +4040,7 @@
           <a:lstStyle/>
           <a:p>
             <a:r>
-              <a:t>PBT MARGIN</a:t>
+              <a:t>Operating Income</a:t>
             </a:r>
           </a:p>
         </p:txBody>
@@ -4060,7 +4061,7 @@
           <a:lstStyle/>
           <a:p>
             <a:r>
-              <a:t>The PBT (Profit Before Tax) margin of Amazon has exhibited significant changes over the years. Here is the data extracted from the financial statements: Years for Analysis: - 2020, 2021, and 2022 PBT Calculation: PBT is derived by taking the operating income and adding/subtracting other non-operating incomes/expenses. Data from 2020 to 2022: - 2020:   - Operating Income: $22.9 billion   - Other Income (Expense), Net: $2.3 billion   - Revenue: $386.1 billion   - Sum: $25.2 billion   - PBT Margin = 25.2 / 386.1 = 6.5% - 2021:   - Operating Income: $24.9 billion   - Other Income (Expense), Net: $14.6 billion   - Revenue: $469.8 billion   - Sum: $39.5 billion   - PBT Margin = 39.5 / 469.8 = 8.4% - 2022:   - Operating Income: $12.2 billion   - Other Income (Expense), Net: $(16.8) billion (loss)   - Revenue: $514.0 billion   - Sum: $(4.6) billion (loss)   - PBT Margin = -4.6 / 514.0 = -0.9% Analysis: From the data above, the PBT margin saw an increasing trend from 2020 (6.5%) to 2021 (8.4%), due to a substantial rise in other income. However, in 2022, Amazon experienced a dramatic decline to a negative PBT margin (-0.9%), mainly attributed to significant losses in other income, reflecting challenges in marketable equity security valuations and increased operating expenses. This illustrates how variability in both operational performance and non-operational factors such as market investments can affect Amazon's financial health across years.</a:t>
+              <a:t>The operating income of Amazon shows significant variation over the period from 2020 to 2022. In 2020, the company's consolidated operating income was $22.899 billion. This amount saw an increase in 2021 to $24.879 billion. However, in 2022, there was a sharp decline to $12.248 billion. Breaking it down by segment: - North America: The operating income was $8.651 billion in 2020, decreased to $7.271 billion in 2021, and turned into an operating loss of $2.847 billion in 2022. This decline was primarily due to increased fulfillment and shipping costs, and investments in the fulfillment network. - International: Operating income was $717 million in 2020, turned into an operating loss of $924 million in 2021, and further worsened to a loss of $7.746 billion in 2022 due to increased fulfillment and shipping costs, and adverse foreign currency exchange effects. - AWS (Amazon Web Services): Operating income increased steadily from $13.531 billion in 2020 to $18.532 billion in 2021, and then further to $22.841 billion in 2022. This increase was driven by higher sales and improved cost structure productivity. Overall, the sharp decline in consolidated operating income in 2022 was influenced by the substantial losses in the North America and International segments, despite the continued growth in AWS operating income.</a:t>
             </a:r>
           </a:p>
         </p:txBody>
@@ -4099,7 +4100,7 @@
           <a:lstStyle/>
           <a:p>
             <a:r>
-              <a:t>Operating Income</a:t>
+              <a:t>Cash Flow</a:t>
             </a:r>
           </a:p>
         </p:txBody>
@@ -4120,7 +4121,7 @@
           <a:lstStyle/>
           <a:p>
             <a:r>
-              <a:t>Amazon's Operating Income has shown significant fluctuations over the observed timeframe. It increased from $22.9 billion in 2020 to $24.9 billion in 2021 before decreasing dramatically to $12.2 billion in 2022.  Breaking it down by segment, the North America segment's operating income decreased from $7.3 billion in 2021 to a loss of $2.8 billion in 2022. This decline is primarily attributed to increased fulfillment and shipping costs, as well as higher technology, content and operational expenses. The International segment fared worse, shifting from a loss of $0.9 billion in 2021 to a loss of $7.7 billion in 2022. The substantial increase in loss is mainly due to elevated fulfillment and shipping costs and the negative impact of changes in foreign currency exchange rates. Conversely, AWS has demonstrated continuous growth, with operating income climbing from $13.5 billion in 2020 to $18.5 billion in 2021, and further to $22.8 billion in 2022. Improvements in cost structure productivity and increased sales volume contribute to this positive trend, indicating a robust performance in the AWS segment.</a:t>
+              <a:t>Over the period from 2020 to 2022, Amazon's cash flow reflects significant investment activities and changes in financing.  - Operating Activities: The net cash provided by operating activities decreased from $66.1 billion in 2020 to $46.3 billion in 2021 and remained relatively stable at $46.8 billion in 2022. This stability in 2022 despite a net income loss was due to adjustments like higher depreciation and amortization, stock-based compensation, and other non-cash items. - Investing Activities: The cash used in investing activities was substantial, decreasing from $(59.6) billion in 2020 to $(58.2) billion in 2021 and further to $(37.6) billion in 2022. This reflects the company's investments in property and equipment, especially advancing its technology infrastructure and fulfillment network. - Financing Activities: The net cash flow from financing activities shifted from $(1.1) billion in 2020 to $6.3 billion in 2021 and increased further to $9.7 billion in 2022, driven by proceeds from debts despite increased repayments and stock repurchases. Amazon demonstrates a robust capacity to generate operating cash flow while heavily reinvesting in its infrastructure and managing its financing to support growth initiatives.</a:t>
             </a:r>
           </a:p>
         </p:txBody>
@@ -4159,7 +4160,7 @@
           <a:lstStyle/>
           <a:p>
             <a:r>
-              <a:t>revenue figures</a:t>
+              <a:t>Revenue figures</a:t>
             </a:r>
           </a:p>
         </p:txBody>
@@ -4183,7 +4184,7 @@
       </p:sp>
       <p:pic>
         <p:nvPicPr>
-          <p:cNvPr id="4" name="Picture 3" descr="revenue_2.png"/>
+          <p:cNvPr id="4" name="Picture 3" descr="revenue_3.png"/>
           <p:cNvPicPr>
             <a:picLocks noChangeAspect="1"/>
           </p:cNvPicPr>
@@ -4207,7 +4208,7 @@
       </p:pic>
       <p:pic>
         <p:nvPicPr>
-          <p:cNvPr id="5" name="Picture 4" descr="revenue_1.png"/>
+          <p:cNvPr id="5" name="Picture 4" descr="revenue_2.png"/>
           <p:cNvPicPr>
             <a:picLocks noChangeAspect="1"/>
           </p:cNvPicPr>
@@ -4222,6 +4223,30 @@
         <p:spPr>
           <a:xfrm>
             <a:off x="5943600" y="1371600"/>
+            <a:ext cx="4572000" cy="2743200"/>
+          </a:xfrm>
+          <a:prstGeom prst="rect">
+            <a:avLst/>
+          </a:prstGeom>
+        </p:spPr>
+      </p:pic>
+      <p:pic>
+        <p:nvPicPr>
+          <p:cNvPr id="6" name="Picture 5" descr="revenue_1.png"/>
+          <p:cNvPicPr>
+            <a:picLocks noChangeAspect="1"/>
+          </p:cNvPicPr>
+          <p:nvPr/>
+        </p:nvPicPr>
+        <p:blipFill>
+          <a:blip r:embed="rId4"/>
+          <a:stretch>
+            <a:fillRect/>
+          </a:stretch>
+        </p:blipFill>
+        <p:spPr>
+          <a:xfrm>
+            <a:off x="914400" y="4114800"/>
             <a:ext cx="4572000" cy="2743200"/>
           </a:xfrm>
           <a:prstGeom prst="rect">
@@ -4263,7 +4288,7 @@
           <a:lstStyle/>
           <a:p>
             <a:r>
-              <a:t>operatingincome figures</a:t>
+              <a:t>Operating Income figures</a:t>
             </a:r>
           </a:p>
         </p:txBody>
@@ -4287,7 +4312,7 @@
       </p:sp>
       <p:pic>
         <p:nvPicPr>
-          <p:cNvPr id="4" name="Picture 3" descr="operatingincome_2.png"/>
+          <p:cNvPr id="4" name="Picture 3" descr="operatingincome_1.png"/>
           <p:cNvPicPr>
             <a:picLocks noChangeAspect="1"/>
           </p:cNvPicPr>
@@ -4302,30 +4327,6 @@
         <p:spPr>
           <a:xfrm>
             <a:off x="914400" y="1371600"/>
-            <a:ext cx="4572000" cy="2743200"/>
-          </a:xfrm>
-          <a:prstGeom prst="rect">
-            <a:avLst/>
-          </a:prstGeom>
-        </p:spPr>
-      </p:pic>
-      <p:pic>
-        <p:nvPicPr>
-          <p:cNvPr id="5" name="Picture 4" descr="operatingincome_1.png"/>
-          <p:cNvPicPr>
-            <a:picLocks noChangeAspect="1"/>
-          </p:cNvPicPr>
-          <p:nvPr/>
-        </p:nvPicPr>
-        <p:blipFill>
-          <a:blip r:embed="rId3"/>
-          <a:stretch>
-            <a:fillRect/>
-          </a:stretch>
-        </p:blipFill>
-        <p:spPr>
-          <a:xfrm>
-            <a:off x="5943600" y="1371600"/>
             <a:ext cx="4572000" cy="2743200"/>
           </a:xfrm>
           <a:prstGeom prst="rect">
@@ -4367,7 +4368,7 @@
           <a:lstStyle/>
           <a:p>
             <a:r>
-              <a:t>pbtmargin figures</a:t>
+              <a:t>Cash Flow figures</a:t>
             </a:r>
           </a:p>
         </p:txBody>
@@ -4391,7 +4392,7 @@
       </p:sp>
       <p:pic>
         <p:nvPicPr>
-          <p:cNvPr id="4" name="Picture 3" descr="pbtmargin_1.png"/>
+          <p:cNvPr id="4" name="Picture 3" descr="cashflow_1.png"/>
           <p:cNvPicPr>
             <a:picLocks noChangeAspect="1"/>
           </p:cNvPicPr>
@@ -4413,6 +4414,129 @@
           </a:prstGeom>
         </p:spPr>
       </p:pic>
+      <p:pic>
+        <p:nvPicPr>
+          <p:cNvPr id="5" name="Picture 4" descr="cashflow_3.png"/>
+          <p:cNvPicPr>
+            <a:picLocks noChangeAspect="1"/>
+          </p:cNvPicPr>
+          <p:nvPr/>
+        </p:nvPicPr>
+        <p:blipFill>
+          <a:blip r:embed="rId3"/>
+          <a:stretch>
+            <a:fillRect/>
+          </a:stretch>
+        </p:blipFill>
+        <p:spPr>
+          <a:xfrm>
+            <a:off x="5943600" y="1371600"/>
+            <a:ext cx="4572000" cy="2743200"/>
+          </a:xfrm>
+          <a:prstGeom prst="rect">
+            <a:avLst/>
+          </a:prstGeom>
+        </p:spPr>
+      </p:pic>
+      <p:pic>
+        <p:nvPicPr>
+          <p:cNvPr id="6" name="Picture 5" descr="cashflow_2.png"/>
+          <p:cNvPicPr>
+            <a:picLocks noChangeAspect="1"/>
+          </p:cNvPicPr>
+          <p:nvPr/>
+        </p:nvPicPr>
+        <p:blipFill>
+          <a:blip r:embed="rId4"/>
+          <a:stretch>
+            <a:fillRect/>
+          </a:stretch>
+        </p:blipFill>
+        <p:spPr>
+          <a:xfrm>
+            <a:off x="914400" y="4114800"/>
+            <a:ext cx="4572000" cy="2743200"/>
+          </a:xfrm>
+          <a:prstGeom prst="rect">
+            <a:avLst/>
+          </a:prstGeom>
+        </p:spPr>
+      </p:pic>
+    </p:spTree>
+  </p:cSld>
+  <p:clrMapOvr>
+    <a:masterClrMapping/>
+  </p:clrMapOvr>
+</p:sld>
+</file>
+
+<file path=ppt/slides/slide9.xml><?xml version="1.0" encoding="utf-8"?>
+<p:sld xmlns:a="http://schemas.openxmlformats.org/drawingml/2006/main" xmlns:p="http://schemas.openxmlformats.org/presentationml/2006/main" xmlns:r="http://schemas.openxmlformats.org/officeDocument/2006/relationships">
+  <p:cSld>
+    <p:spTree>
+      <p:nvGrpSpPr>
+        <p:cNvPr id="1" name=""/>
+        <p:cNvGrpSpPr/>
+        <p:nvPr/>
+      </p:nvGrpSpPr>
+      <p:grpSpPr/>
+      <p:sp>
+        <p:nvSpPr>
+          <p:cNvPr id="2" name="Title 1"/>
+          <p:cNvSpPr>
+            <a:spLocks noGrp="1"/>
+          </p:cNvSpPr>
+          <p:nvPr>
+            <p:ph type="title"/>
+          </p:nvPr>
+        </p:nvSpPr>
+        <p:spPr/>
+        <p:txBody>
+          <a:bodyPr/>
+          <a:lstStyle/>
+          <a:p>
+            <a:r>
+              <a:t>Sentiment Analysis Results</a:t>
+            </a:r>
+          </a:p>
+        </p:txBody>
+      </p:sp>
+      <p:sp>
+        <p:nvSpPr>
+          <p:cNvPr id="3" name="Content Placeholder 2"/>
+          <p:cNvSpPr>
+            <a:spLocks noGrp="1"/>
+          </p:cNvSpPr>
+          <p:nvPr>
+            <p:ph idx="1"/>
+          </p:nvPr>
+        </p:nvSpPr>
+        <p:spPr/>
+        <p:txBody>
+          <a:bodyPr/>
+          <a:lstStyle/>
+          <a:p>
+            <a:r>
+              <a:t>Overall: 48 </a:t>
+            </a:r>
+          </a:p>
+          <a:p>
+            <a:r>
+              <a:t> Positive: 0.0 </a:t>
+            </a:r>
+          </a:p>
+          <a:p>
+            <a:r>
+              <a:t> Neutral: 0.82 </a:t>
+            </a:r>
+          </a:p>
+          <a:p>
+            <a:r>
+              <a:t> Negative: 0.05</a:t>
+            </a:r>
+          </a:p>
+        </p:txBody>
+      </p:sp>
     </p:spTree>
   </p:cSld>
   <p:clrMapOvr>

</xml_diff>

<commit_message>
removal of dead wood
</commit_message>
<xml_diff>
--- a/fastapi-backend/app/pres/output.pptx
+++ b/fastapi-backend/app/pres/output.pptx
@@ -7,6 +7,15 @@
   <p:sldIdLst>
     <p:sldId id="256" r:id="rId2"/>
     <p:sldId id="257" r:id="rId7"/>
+    <p:sldId id="258" r:id="rId8"/>
+    <p:sldId id="262" r:id="rId12"/>
+    <p:sldId id="259" r:id="rId9"/>
+    <p:sldId id="263" r:id="rId13"/>
+    <p:sldId id="260" r:id="rId10"/>
+    <p:sldId id="264" r:id="rId14"/>
+    <p:sldId id="261" r:id="rId11"/>
+    <p:sldId id="265" r:id="rId15"/>
+    <p:sldId id="266" r:id="rId16"/>
   </p:sldIdLst>
   <p:sldSz cx="12192000" cy="6858000"/>
   <p:notesSz cx="6858000" cy="9144000"/>
@@ -3869,8 +3878,7 @@
           <a:lstStyle/>
           <a:p>
             <a:r>
-              <a:rPr lang="en-GB" dirty="0"/>
-              <a:t>Company Analysis</a:t>
+              <a:t>Amazon.com, Inc. Analysis</a:t>
             </a:r>
           </a:p>
         </p:txBody>
@@ -3881,6 +3889,161 @@
         <p14:creationId xmlns:p14="http://schemas.microsoft.com/office/powerpoint/2010/main" val="3353909387"/>
       </p:ext>
     </p:extLst>
+  </p:cSld>
+  <p:clrMapOvr>
+    <a:masterClrMapping/>
+  </p:clrMapOvr>
+</p:sld>
+</file>
+
+<file path=ppt/slides/slide10.xml><?xml version="1.0" encoding="utf-8"?>
+<p:sld xmlns:a="http://schemas.openxmlformats.org/drawingml/2006/main" xmlns:p="http://schemas.openxmlformats.org/presentationml/2006/main" xmlns:r="http://schemas.openxmlformats.org/officeDocument/2006/relationships">
+  <p:cSld>
+    <p:spTree>
+      <p:nvGrpSpPr>
+        <p:cNvPr id="1" name=""/>
+        <p:cNvGrpSpPr/>
+        <p:nvPr/>
+      </p:nvGrpSpPr>
+      <p:grpSpPr/>
+      <p:sp>
+        <p:nvSpPr>
+          <p:cNvPr id="2" name="Title 1"/>
+          <p:cNvSpPr>
+            <a:spLocks noGrp="1"/>
+          </p:cNvSpPr>
+          <p:nvPr>
+            <p:ph type="title"/>
+          </p:nvPr>
+        </p:nvSpPr>
+        <p:spPr/>
+        <p:txBody>
+          <a:bodyPr/>
+          <a:lstStyle/>
+          <a:p>
+            <a:r>
+              <a:t>PBT Margin figures</a:t>
+            </a:r>
+          </a:p>
+        </p:txBody>
+      </p:sp>
+      <p:sp>
+        <p:nvSpPr>
+          <p:cNvPr id="3" name="Content Placeholder 2"/>
+          <p:cNvSpPr>
+            <a:spLocks noGrp="1"/>
+          </p:cNvSpPr>
+          <p:nvPr>
+            <p:ph idx="1"/>
+          </p:nvPr>
+        </p:nvSpPr>
+        <p:spPr/>
+        <p:txBody>
+          <a:bodyPr/>
+          <a:lstStyle/>
+          <a:p/>
+        </p:txBody>
+      </p:sp>
+      <p:pic>
+        <p:nvPicPr>
+          <p:cNvPr id="4" name="Picture 3" descr="pbtmargin_1.png"/>
+          <p:cNvPicPr>
+            <a:picLocks noChangeAspect="1"/>
+          </p:cNvPicPr>
+          <p:nvPr/>
+        </p:nvPicPr>
+        <p:blipFill>
+          <a:blip r:embed="rId2"/>
+          <a:stretch>
+            <a:fillRect/>
+          </a:stretch>
+        </p:blipFill>
+        <p:spPr>
+          <a:xfrm>
+            <a:off x="914400" y="1371600"/>
+            <a:ext cx="4572000" cy="2743200"/>
+          </a:xfrm>
+          <a:prstGeom prst="rect">
+            <a:avLst/>
+          </a:prstGeom>
+        </p:spPr>
+      </p:pic>
+    </p:spTree>
+  </p:cSld>
+  <p:clrMapOvr>
+    <a:masterClrMapping/>
+  </p:clrMapOvr>
+</p:sld>
+</file>
+
+<file path=ppt/slides/slide11.xml><?xml version="1.0" encoding="utf-8"?>
+<p:sld xmlns:a="http://schemas.openxmlformats.org/drawingml/2006/main" xmlns:p="http://schemas.openxmlformats.org/presentationml/2006/main" xmlns:r="http://schemas.openxmlformats.org/officeDocument/2006/relationships">
+  <p:cSld>
+    <p:spTree>
+      <p:nvGrpSpPr>
+        <p:cNvPr id="1" name=""/>
+        <p:cNvGrpSpPr/>
+        <p:nvPr/>
+      </p:nvGrpSpPr>
+      <p:grpSpPr/>
+      <p:sp>
+        <p:nvSpPr>
+          <p:cNvPr id="2" name="Title 1"/>
+          <p:cNvSpPr>
+            <a:spLocks noGrp="1"/>
+          </p:cNvSpPr>
+          <p:nvPr>
+            <p:ph type="title"/>
+          </p:nvPr>
+        </p:nvSpPr>
+        <p:spPr/>
+        <p:txBody>
+          <a:bodyPr/>
+          <a:lstStyle/>
+          <a:p>
+            <a:r>
+              <a:t>Sentiment Analysis Results</a:t>
+            </a:r>
+          </a:p>
+        </p:txBody>
+      </p:sp>
+      <p:sp>
+        <p:nvSpPr>
+          <p:cNvPr id="3" name="Content Placeholder 2"/>
+          <p:cNvSpPr>
+            <a:spLocks noGrp="1"/>
+          </p:cNvSpPr>
+          <p:nvPr>
+            <p:ph idx="1"/>
+          </p:nvPr>
+        </p:nvSpPr>
+        <p:spPr/>
+        <p:txBody>
+          <a:bodyPr/>
+          <a:lstStyle/>
+          <a:p>
+            <a:r>
+              <a:t>Overall: 47 </a:t>
+            </a:r>
+          </a:p>
+          <a:p>
+            <a:r>
+              <a:t> Positive: 0.0 </a:t>
+            </a:r>
+          </a:p>
+          <a:p>
+            <a:r>
+              <a:t> Neutral: 0.78 </a:t>
+            </a:r>
+          </a:p>
+          <a:p>
+            <a:r>
+              <a:t> Negative: 0.06</a:t>
+            </a:r>
+          </a:p>
+        </p:txBody>
+      </p:sp>
+    </p:spTree>
   </p:cSld>
   <p:clrMapOvr>
     <a:masterClrMapping/>
@@ -3914,7 +4077,7 @@
           <a:lstStyle/>
           <a:p>
             <a:r>
-              <a:t>{"body": "Test Item"}</a:t>
+              <a:t>Business Overview</a:t>
             </a:r>
           </a:p>
         </p:txBody>
@@ -3935,11 +4098,563 @@
           <a:lstStyle/>
           <a:p>
             <a:r>
-              <a:t>Please upload the financial statements so I can proceed with the analysis of the "Test Item" of the company.</a:t>
-            </a:r>
-          </a:p>
-        </p:txBody>
-      </p:sp>
+              <a:t>Amazon's business has evolved significantly over time. Initially, Amazon focused on offering a wide range of products and services, including merchandise, digital content, and electronic devices. The company has also provided services like cloud computing, storage, and fulfillment. Over the years, Amazon has expanded its market by pursuing large retail segments and experimenting with new ventures like Amazon Fresh in the grocery segment and Amazon Pharmacy in healthcare. Furthermore, it has strengthened its e-commerce capabilities through ventures like Amazon Business, launched in 2015, which now drives approximately $35 billion in annualized gross sales. Amazon’s approach to its business operations focuses on long-term, sustainable growth in free cash flows through increasing sales and efficient cost management. The company emphasizes improving the customer experience by lowering prices, expanding product selection, and enhancing delivery efficiency. Despite the macroeconomic challenges such as inflation and supply chain constraints, Amazon remains committed to investing in new technologies and market opportunities. This ongoing evolution demonstrates Amazon's strategic adaptation to market demands and growth opportunities.</a:t>
+            </a:r>
+          </a:p>
+        </p:txBody>
+      </p:sp>
+    </p:spTree>
+  </p:cSld>
+  <p:clrMapOvr>
+    <a:masterClrMapping/>
+  </p:clrMapOvr>
+</p:sld>
+</file>
+
+<file path=ppt/slides/slide3.xml><?xml version="1.0" encoding="utf-8"?>
+<p:sld xmlns:a="http://schemas.openxmlformats.org/drawingml/2006/main" xmlns:p="http://schemas.openxmlformats.org/presentationml/2006/main" xmlns:r="http://schemas.openxmlformats.org/officeDocument/2006/relationships">
+  <p:cSld>
+    <p:spTree>
+      <p:nvGrpSpPr>
+        <p:cNvPr id="1" name=""/>
+        <p:cNvGrpSpPr/>
+        <p:nvPr/>
+      </p:nvGrpSpPr>
+      <p:grpSpPr/>
+      <p:sp>
+        <p:nvSpPr>
+          <p:cNvPr id="2" name="Title 1"/>
+          <p:cNvSpPr>
+            <a:spLocks noGrp="1"/>
+          </p:cNvSpPr>
+          <p:nvPr>
+            <p:ph type="title"/>
+          </p:nvPr>
+        </p:nvSpPr>
+        <p:spPr/>
+        <p:txBody>
+          <a:bodyPr/>
+          <a:lstStyle/>
+          <a:p>
+            <a:r>
+              <a:t>Revenue</a:t>
+            </a:r>
+          </a:p>
+        </p:txBody>
+      </p:sp>
+      <p:sp>
+        <p:nvSpPr>
+          <p:cNvPr id="3" name="Content Placeholder 2"/>
+          <p:cNvSpPr>
+            <a:spLocks noGrp="1"/>
+          </p:cNvSpPr>
+          <p:nvPr>
+            <p:ph idx="1"/>
+          </p:nvPr>
+        </p:nvSpPr>
+        <p:spPr/>
+        <p:txBody>
+          <a:bodyPr wrap="square"/>
+          <a:lstStyle/>
+          <a:p>
+            <a:r>
+              <a:t>From 2020 to 2023, Amazon's revenue has seen consistent growth. In 2020, the total net sales were $386,064 million. This increased to $469,822 million in 2021, representing a 22% year-over-year growth. By 2022, the net sales reached $513,983 million, a 9% increase from the previous year. Finally, in 2023, the net sales were $574,785 million, reflecting a growth rate of 12% compared to 2022. The breakdown of sales across segments shows that the North America segment has consistently delivered the highest revenue, growing from $279,833 million in 2021 to $352,828 million in 2023. The International segment's performance has been more volatile, with net sales decreasing from $127,787 million in 2021 to $118,007 million in 2022, before increasing to $131,200 million in 2023. AWS has maintained steady growth, with revenue increasing from $62,202 million in 2021 to $80,096 million in 2022, and $90,757 million in 2023.  The overall increase in revenue can be attributed to factors such as increased unit sales driven by better price, selection, and convenience for customers, along with significant growth in AWS and advertising services.</a:t>
+            </a:r>
+          </a:p>
+        </p:txBody>
+      </p:sp>
+    </p:spTree>
+  </p:cSld>
+  <p:clrMapOvr>
+    <a:masterClrMapping/>
+  </p:clrMapOvr>
+</p:sld>
+</file>
+
+<file path=ppt/slides/slide4.xml><?xml version="1.0" encoding="utf-8"?>
+<p:sld xmlns:a="http://schemas.openxmlformats.org/drawingml/2006/main" xmlns:p="http://schemas.openxmlformats.org/presentationml/2006/main" xmlns:r="http://schemas.openxmlformats.org/officeDocument/2006/relationships">
+  <p:cSld>
+    <p:spTree>
+      <p:nvGrpSpPr>
+        <p:cNvPr id="1" name=""/>
+        <p:cNvGrpSpPr/>
+        <p:nvPr/>
+      </p:nvGrpSpPr>
+      <p:grpSpPr/>
+      <p:sp>
+        <p:nvSpPr>
+          <p:cNvPr id="2" name="Title 1"/>
+          <p:cNvSpPr>
+            <a:spLocks noGrp="1"/>
+          </p:cNvSpPr>
+          <p:nvPr>
+            <p:ph type="title"/>
+          </p:nvPr>
+        </p:nvSpPr>
+        <p:spPr/>
+        <p:txBody>
+          <a:bodyPr/>
+          <a:lstStyle/>
+          <a:p>
+            <a:r>
+              <a:t>Operating Income</a:t>
+            </a:r>
+          </a:p>
+        </p:txBody>
+      </p:sp>
+      <p:sp>
+        <p:nvSpPr>
+          <p:cNvPr id="3" name="Content Placeholder 2"/>
+          <p:cNvSpPr>
+            <a:spLocks noGrp="1"/>
+          </p:cNvSpPr>
+          <p:nvPr>
+            <p:ph idx="1"/>
+          </p:nvPr>
+        </p:nvSpPr>
+        <p:spPr/>
+        <p:txBody>
+          <a:bodyPr wrap="square"/>
+          <a:lstStyle/>
+          <a:p>
+            <a:r>
+              <a:t>The operating income of the company has demonstrated significant volatility over the period from 2021 to 2023. In 2021, the consolidated operating income was $24.9 billion. However, in 2022, it almost halved to $12.2 billion due to increased costs across various segments, particularly in the North America and International divisions. By 2023, the operating income rebounded strongly to $36.9 billion, primarily driven by substantial improvements in the North America segment, which swung from a loss of $2.8 billion in 2022 to an income of $14.9 billion. This rebound was attributed to increased unit sales and advertising sales, despite higher shipping and fulfillment costs.  The AWS (Amazon Web Services) segment consistently grew its operating income from $18.5 billion in 2021 to $24.6 billion in 2023, reflecting increased sales and significant investment in technology infrastructure. Conversely, the International segment saw a reduction in operating loss from $7.7 billion in 2022 to $2.7 billion in 2023 due to increased sales and better cost management. These fluctuations highlight the company's reliance on North America and AWS for profitability, and the impact of cost management and sales growth on operating income.</a:t>
+            </a:r>
+          </a:p>
+        </p:txBody>
+      </p:sp>
+    </p:spTree>
+  </p:cSld>
+  <p:clrMapOvr>
+    <a:masterClrMapping/>
+  </p:clrMapOvr>
+</p:sld>
+</file>
+
+<file path=ppt/slides/slide5.xml><?xml version="1.0" encoding="utf-8"?>
+<p:sld xmlns:a="http://schemas.openxmlformats.org/drawingml/2006/main" xmlns:p="http://schemas.openxmlformats.org/presentationml/2006/main" xmlns:r="http://schemas.openxmlformats.org/officeDocument/2006/relationships">
+  <p:cSld>
+    <p:spTree>
+      <p:nvGrpSpPr>
+        <p:cNvPr id="1" name=""/>
+        <p:cNvGrpSpPr/>
+        <p:nvPr/>
+      </p:nvGrpSpPr>
+      <p:grpSpPr/>
+      <p:sp>
+        <p:nvSpPr>
+          <p:cNvPr id="2" name="Title 1"/>
+          <p:cNvSpPr>
+            <a:spLocks noGrp="1"/>
+          </p:cNvSpPr>
+          <p:nvPr>
+            <p:ph type="title"/>
+          </p:nvPr>
+        </p:nvSpPr>
+        <p:spPr/>
+        <p:txBody>
+          <a:bodyPr/>
+          <a:lstStyle/>
+          <a:p>
+            <a:r>
+              <a:t>Cash Flow</a:t>
+            </a:r>
+          </a:p>
+        </p:txBody>
+      </p:sp>
+      <p:sp>
+        <p:nvSpPr>
+          <p:cNvPr id="3" name="Content Placeholder 2"/>
+          <p:cNvSpPr>
+            <a:spLocks noGrp="1"/>
+          </p:cNvSpPr>
+          <p:nvPr>
+            <p:ph idx="1"/>
+          </p:nvPr>
+        </p:nvSpPr>
+        <p:spPr/>
+        <p:txBody>
+          <a:bodyPr wrap="square"/>
+          <a:lstStyle/>
+          <a:p>
+            <a:r>
+              <a:t> Amazon's cash flow from operating activities exhibited fluctuations over the reported period. In 2021, the net cash provided by operating activities was $46.3 billion. This figure saw a slight increase in 2022, reaching $46.8 billion, before significantly jumping to $84.9 billion in 2023. The increase in 2023 was primarily driven by higher net income (excluding non-cash expenses) and improvements in working capital. Investing activities consistently saw outflows across the years. In 2021, net cash used in investing activities was $58.2 billion, which decreased to $37.6 billion in 2022 but then increased again to $49.8 billion in 2023. These outflows were mainly due to significant purchases of property and equipment and also included acquisitions and investments in marketable securities. Financing activities, on the other hand, showed variability. In 2021, there was a net cash inflow of $6.3 billion, which increased to $9.7 billion in 2022, before turning into a significant outflow of $15.9 billion in 2023. This shift in 2023 was due to a combination of increased debt repayments and reduced issuance of new debt. Overall, despite the fluctuations in investing and financing activities, the substantial growth in cash generated from operating activities in 2023 marks a notable positive change in Amazon's cash flow dynamics over the analyzed period.</a:t>
+            </a:r>
+          </a:p>
+        </p:txBody>
+      </p:sp>
+    </p:spTree>
+  </p:cSld>
+  <p:clrMapOvr>
+    <a:masterClrMapping/>
+  </p:clrMapOvr>
+</p:sld>
+</file>
+
+<file path=ppt/slides/slide6.xml><?xml version="1.0" encoding="utf-8"?>
+<p:sld xmlns:a="http://schemas.openxmlformats.org/drawingml/2006/main" xmlns:p="http://schemas.openxmlformats.org/presentationml/2006/main" xmlns:r="http://schemas.openxmlformats.org/officeDocument/2006/relationships">
+  <p:cSld>
+    <p:spTree>
+      <p:nvGrpSpPr>
+        <p:cNvPr id="1" name=""/>
+        <p:cNvGrpSpPr/>
+        <p:nvPr/>
+      </p:nvGrpSpPr>
+      <p:grpSpPr/>
+      <p:sp>
+        <p:nvSpPr>
+          <p:cNvPr id="2" name="Title 1"/>
+          <p:cNvSpPr>
+            <a:spLocks noGrp="1"/>
+          </p:cNvSpPr>
+          <p:nvPr>
+            <p:ph type="title"/>
+          </p:nvPr>
+        </p:nvSpPr>
+        <p:spPr/>
+        <p:txBody>
+          <a:bodyPr/>
+          <a:lstStyle/>
+          <a:p>
+            <a:r>
+              <a:t>PBT Margin</a:t>
+            </a:r>
+          </a:p>
+        </p:txBody>
+      </p:sp>
+      <p:sp>
+        <p:nvSpPr>
+          <p:cNvPr id="3" name="Content Placeholder 2"/>
+          <p:cNvSpPr>
+            <a:spLocks noGrp="1"/>
+          </p:cNvSpPr>
+          <p:nvPr>
+            <p:ph idx="1"/>
+          </p:nvPr>
+        </p:nvSpPr>
+        <p:spPr/>
+        <p:txBody>
+          <a:bodyPr wrap="square"/>
+          <a:lstStyle/>
+          <a:p>
+            <a:r>
+              <a:t>To analyze the Profit Before Tax (PBT) margin of the company over time, we look at the operating income and net sales for the relevant years. 2020: - Consolidated Operating Income: $24,879 million - Net Sales: $469,822 million - PBT Margin = (Operating Income / Net Sales) × 100 = ($24,879 / $469,822) × 100 = 5.29% 2021: - Consolidated Operating Income: $24,879 million - Net Sales: $469,822 million - PBT Margin = (Operating Income / Net Sales) × 100 = ($24,879 / $469,822) × 100 = 5.29% 2022: - Consolidated Operating Income: $12,248 million - Net Sales: $513,983 million - PBT Margin = (Operating Income / Net Sales) × 100 = ($12,248 / $513,983) × 100 = 2.38% 2023: - Consolidated Operating Income: $36,852 million - Net Sales: $574,785 million - PBT Margin = (Operating Income / Net Sales) × 100 = ($36,852 / $574,785) × 100 = 6.41% The PBT margin has shown significant variability over the years. It remained relatively stable at around 5.3% in 2020 and 2021, fell sharply to 2.38% in 2022, and then increased substantially to 6.41% in 2023. This fluctuation is primarily attributed to changes in operating income.</a:t>
+            </a:r>
+          </a:p>
+        </p:txBody>
+      </p:sp>
+    </p:spTree>
+  </p:cSld>
+  <p:clrMapOvr>
+    <a:masterClrMapping/>
+  </p:clrMapOvr>
+</p:sld>
+</file>
+
+<file path=ppt/slides/slide7.xml><?xml version="1.0" encoding="utf-8"?>
+<p:sld xmlns:a="http://schemas.openxmlformats.org/drawingml/2006/main" xmlns:p="http://schemas.openxmlformats.org/presentationml/2006/main" xmlns:r="http://schemas.openxmlformats.org/officeDocument/2006/relationships">
+  <p:cSld>
+    <p:spTree>
+      <p:nvGrpSpPr>
+        <p:cNvPr id="1" name=""/>
+        <p:cNvGrpSpPr/>
+        <p:nvPr/>
+      </p:nvGrpSpPr>
+      <p:grpSpPr/>
+      <p:sp>
+        <p:nvSpPr>
+          <p:cNvPr id="2" name="Title 1"/>
+          <p:cNvSpPr>
+            <a:spLocks noGrp="1"/>
+          </p:cNvSpPr>
+          <p:nvPr>
+            <p:ph type="title"/>
+          </p:nvPr>
+        </p:nvSpPr>
+        <p:spPr/>
+        <p:txBody>
+          <a:bodyPr/>
+          <a:lstStyle/>
+          <a:p>
+            <a:r>
+              <a:t>Revenue figures</a:t>
+            </a:r>
+          </a:p>
+        </p:txBody>
+      </p:sp>
+      <p:sp>
+        <p:nvSpPr>
+          <p:cNvPr id="3" name="Content Placeholder 2"/>
+          <p:cNvSpPr>
+            <a:spLocks noGrp="1"/>
+          </p:cNvSpPr>
+          <p:nvPr>
+            <p:ph idx="1"/>
+          </p:nvPr>
+        </p:nvSpPr>
+        <p:spPr/>
+        <p:txBody>
+          <a:bodyPr/>
+          <a:lstStyle/>
+          <a:p/>
+        </p:txBody>
+      </p:sp>
+      <p:pic>
+        <p:nvPicPr>
+          <p:cNvPr id="4" name="Picture 3" descr="revenue_2.png"/>
+          <p:cNvPicPr>
+            <a:picLocks noChangeAspect="1"/>
+          </p:cNvPicPr>
+          <p:nvPr/>
+        </p:nvPicPr>
+        <p:blipFill>
+          <a:blip r:embed="rId2"/>
+          <a:stretch>
+            <a:fillRect/>
+          </a:stretch>
+        </p:blipFill>
+        <p:spPr>
+          <a:xfrm>
+            <a:off x="914400" y="1371600"/>
+            <a:ext cx="4572000" cy="2743200"/>
+          </a:xfrm>
+          <a:prstGeom prst="rect">
+            <a:avLst/>
+          </a:prstGeom>
+        </p:spPr>
+      </p:pic>
+      <p:pic>
+        <p:nvPicPr>
+          <p:cNvPr id="5" name="Picture 4" descr="revenue_1.png"/>
+          <p:cNvPicPr>
+            <a:picLocks noChangeAspect="1"/>
+          </p:cNvPicPr>
+          <p:nvPr/>
+        </p:nvPicPr>
+        <p:blipFill>
+          <a:blip r:embed="rId3"/>
+          <a:stretch>
+            <a:fillRect/>
+          </a:stretch>
+        </p:blipFill>
+        <p:spPr>
+          <a:xfrm>
+            <a:off x="5943600" y="1371600"/>
+            <a:ext cx="4572000" cy="2743200"/>
+          </a:xfrm>
+          <a:prstGeom prst="rect">
+            <a:avLst/>
+          </a:prstGeom>
+        </p:spPr>
+      </p:pic>
+    </p:spTree>
+  </p:cSld>
+  <p:clrMapOvr>
+    <a:masterClrMapping/>
+  </p:clrMapOvr>
+</p:sld>
+</file>
+
+<file path=ppt/slides/slide8.xml><?xml version="1.0" encoding="utf-8"?>
+<p:sld xmlns:a="http://schemas.openxmlformats.org/drawingml/2006/main" xmlns:p="http://schemas.openxmlformats.org/presentationml/2006/main" xmlns:r="http://schemas.openxmlformats.org/officeDocument/2006/relationships">
+  <p:cSld>
+    <p:spTree>
+      <p:nvGrpSpPr>
+        <p:cNvPr id="1" name=""/>
+        <p:cNvGrpSpPr/>
+        <p:nvPr/>
+      </p:nvGrpSpPr>
+      <p:grpSpPr/>
+      <p:sp>
+        <p:nvSpPr>
+          <p:cNvPr id="2" name="Title 1"/>
+          <p:cNvSpPr>
+            <a:spLocks noGrp="1"/>
+          </p:cNvSpPr>
+          <p:nvPr>
+            <p:ph type="title"/>
+          </p:nvPr>
+        </p:nvSpPr>
+        <p:spPr/>
+        <p:txBody>
+          <a:bodyPr/>
+          <a:lstStyle/>
+          <a:p>
+            <a:r>
+              <a:t>Operating Income figures</a:t>
+            </a:r>
+          </a:p>
+        </p:txBody>
+      </p:sp>
+      <p:sp>
+        <p:nvSpPr>
+          <p:cNvPr id="3" name="Content Placeholder 2"/>
+          <p:cNvSpPr>
+            <a:spLocks noGrp="1"/>
+          </p:cNvSpPr>
+          <p:nvPr>
+            <p:ph idx="1"/>
+          </p:nvPr>
+        </p:nvSpPr>
+        <p:spPr/>
+        <p:txBody>
+          <a:bodyPr/>
+          <a:lstStyle/>
+          <a:p/>
+        </p:txBody>
+      </p:sp>
+      <p:pic>
+        <p:nvPicPr>
+          <p:cNvPr id="4" name="Picture 3" descr="operatingincome_1.png"/>
+          <p:cNvPicPr>
+            <a:picLocks noChangeAspect="1"/>
+          </p:cNvPicPr>
+          <p:nvPr/>
+        </p:nvPicPr>
+        <p:blipFill>
+          <a:blip r:embed="rId2"/>
+          <a:stretch>
+            <a:fillRect/>
+          </a:stretch>
+        </p:blipFill>
+        <p:spPr>
+          <a:xfrm>
+            <a:off x="914400" y="1371600"/>
+            <a:ext cx="4572000" cy="2743200"/>
+          </a:xfrm>
+          <a:prstGeom prst="rect">
+            <a:avLst/>
+          </a:prstGeom>
+        </p:spPr>
+      </p:pic>
+    </p:spTree>
+  </p:cSld>
+  <p:clrMapOvr>
+    <a:masterClrMapping/>
+  </p:clrMapOvr>
+</p:sld>
+</file>
+
+<file path=ppt/slides/slide9.xml><?xml version="1.0" encoding="utf-8"?>
+<p:sld xmlns:a="http://schemas.openxmlformats.org/drawingml/2006/main" xmlns:p="http://schemas.openxmlformats.org/presentationml/2006/main" xmlns:r="http://schemas.openxmlformats.org/officeDocument/2006/relationships">
+  <p:cSld>
+    <p:spTree>
+      <p:nvGrpSpPr>
+        <p:cNvPr id="1" name=""/>
+        <p:cNvGrpSpPr/>
+        <p:nvPr/>
+      </p:nvGrpSpPr>
+      <p:grpSpPr/>
+      <p:sp>
+        <p:nvSpPr>
+          <p:cNvPr id="2" name="Title 1"/>
+          <p:cNvSpPr>
+            <a:spLocks noGrp="1"/>
+          </p:cNvSpPr>
+          <p:nvPr>
+            <p:ph type="title"/>
+          </p:nvPr>
+        </p:nvSpPr>
+        <p:spPr/>
+        <p:txBody>
+          <a:bodyPr/>
+          <a:lstStyle/>
+          <a:p>
+            <a:r>
+              <a:t>Cash Flow figures</a:t>
+            </a:r>
+          </a:p>
+        </p:txBody>
+      </p:sp>
+      <p:sp>
+        <p:nvSpPr>
+          <p:cNvPr id="3" name="Content Placeholder 2"/>
+          <p:cNvSpPr>
+            <a:spLocks noGrp="1"/>
+          </p:cNvSpPr>
+          <p:nvPr>
+            <p:ph idx="1"/>
+          </p:nvPr>
+        </p:nvSpPr>
+        <p:spPr/>
+        <p:txBody>
+          <a:bodyPr/>
+          <a:lstStyle/>
+          <a:p/>
+        </p:txBody>
+      </p:sp>
+      <p:pic>
+        <p:nvPicPr>
+          <p:cNvPr id="4" name="Picture 3" descr="cashflow_1.png"/>
+          <p:cNvPicPr>
+            <a:picLocks noChangeAspect="1"/>
+          </p:cNvPicPr>
+          <p:nvPr/>
+        </p:nvPicPr>
+        <p:blipFill>
+          <a:blip r:embed="rId2"/>
+          <a:stretch>
+            <a:fillRect/>
+          </a:stretch>
+        </p:blipFill>
+        <p:spPr>
+          <a:xfrm>
+            <a:off x="914400" y="1371600"/>
+            <a:ext cx="4572000" cy="2743200"/>
+          </a:xfrm>
+          <a:prstGeom prst="rect">
+            <a:avLst/>
+          </a:prstGeom>
+        </p:spPr>
+      </p:pic>
+      <p:pic>
+        <p:nvPicPr>
+          <p:cNvPr id="5" name="Picture 4" descr="cashflow_3.png"/>
+          <p:cNvPicPr>
+            <a:picLocks noChangeAspect="1"/>
+          </p:cNvPicPr>
+          <p:nvPr/>
+        </p:nvPicPr>
+        <p:blipFill>
+          <a:blip r:embed="rId3"/>
+          <a:stretch>
+            <a:fillRect/>
+          </a:stretch>
+        </p:blipFill>
+        <p:spPr>
+          <a:xfrm>
+            <a:off x="5943600" y="1371600"/>
+            <a:ext cx="4572000" cy="2743200"/>
+          </a:xfrm>
+          <a:prstGeom prst="rect">
+            <a:avLst/>
+          </a:prstGeom>
+        </p:spPr>
+      </p:pic>
+      <p:pic>
+        <p:nvPicPr>
+          <p:cNvPr id="6" name="Picture 5" descr="cashflow_2.png"/>
+          <p:cNvPicPr>
+            <a:picLocks noChangeAspect="1"/>
+          </p:cNvPicPr>
+          <p:nvPr/>
+        </p:nvPicPr>
+        <p:blipFill>
+          <a:blip r:embed="rId4"/>
+          <a:stretch>
+            <a:fillRect/>
+          </a:stretch>
+        </p:blipFill>
+        <p:spPr>
+          <a:xfrm>
+            <a:off x="914400" y="4114800"/>
+            <a:ext cx="4572000" cy="2743200"/>
+          </a:xfrm>
+          <a:prstGeom prst="rect">
+            <a:avLst/>
+          </a:prstGeom>
+        </p:spPr>
+      </p:pic>
     </p:spTree>
   </p:cSld>
   <p:clrMapOvr>

</xml_diff>